<commit_message>
Modularizes terraform scripts and added s3 backend support for terraform state maintanance
</commit_message>
<xml_diff>
--- a/Designs/Architecture.pptx
+++ b/Designs/Architecture.pptx
@@ -6,6 +6,7 @@
   </p:sldMasterIdLst>
   <p:sldIdLst>
     <p:sldId id="256" r:id="rId2"/>
+    <p:sldId id="257" r:id="rId3"/>
   </p:sldIdLst>
   <p:sldSz cx="12192000" cy="6858000"/>
   <p:notesSz cx="6858000" cy="9144000"/>
@@ -110,6 +111,3276 @@
     </p:ext>
   </p:extLst>
 </p:presentation>
+</file>
+
+<file path=ppt/diagrams/colors1.xml><?xml version="1.0" encoding="utf-8"?>
+<dgm:colorsDef xmlns:dgm="http://schemas.openxmlformats.org/drawingml/2006/diagram" xmlns:a="http://schemas.openxmlformats.org/drawingml/2006/main" uniqueId="urn:microsoft.com/office/officeart/2005/8/colors/colorful1">
+  <dgm:title val=""/>
+  <dgm:desc val=""/>
+  <dgm:catLst>
+    <dgm:cat type="colorful" pri="10100"/>
+  </dgm:catLst>
+  <dgm:styleLbl name="node0">
+    <dgm:fillClrLst meth="repeat">
+      <a:schemeClr val="accent1"/>
+    </dgm:fillClrLst>
+    <dgm:linClrLst meth="repeat">
+      <a:schemeClr val="lt1"/>
+    </dgm:linClrLst>
+    <dgm:effectClrLst/>
+    <dgm:txLinClrLst/>
+    <dgm:txFillClrLst/>
+    <dgm:txEffectClrLst/>
+  </dgm:styleLbl>
+  <dgm:styleLbl name="node1">
+    <dgm:fillClrLst meth="repeat">
+      <a:schemeClr val="accent2"/>
+      <a:schemeClr val="accent3"/>
+      <a:schemeClr val="accent4"/>
+      <a:schemeClr val="accent5"/>
+      <a:schemeClr val="accent6"/>
+    </dgm:fillClrLst>
+    <dgm:linClrLst meth="repeat">
+      <a:schemeClr val="lt1"/>
+    </dgm:linClrLst>
+    <dgm:effectClrLst/>
+    <dgm:txLinClrLst/>
+    <dgm:txFillClrLst/>
+    <dgm:txEffectClrLst/>
+  </dgm:styleLbl>
+  <dgm:styleLbl name="alignNode1">
+    <dgm:fillClrLst meth="repeat">
+      <a:schemeClr val="accent2"/>
+      <a:schemeClr val="accent3"/>
+      <a:schemeClr val="accent4"/>
+      <a:schemeClr val="accent5"/>
+      <a:schemeClr val="accent6"/>
+    </dgm:fillClrLst>
+    <dgm:linClrLst meth="repeat">
+      <a:schemeClr val="accent2"/>
+      <a:schemeClr val="accent3"/>
+      <a:schemeClr val="accent4"/>
+      <a:schemeClr val="accent5"/>
+      <a:schemeClr val="accent6"/>
+    </dgm:linClrLst>
+    <dgm:effectClrLst/>
+    <dgm:txLinClrLst/>
+    <dgm:txFillClrLst/>
+    <dgm:txEffectClrLst/>
+  </dgm:styleLbl>
+  <dgm:styleLbl name="lnNode1">
+    <dgm:fillClrLst meth="repeat">
+      <a:schemeClr val="accent2"/>
+      <a:schemeClr val="accent3"/>
+      <a:schemeClr val="accent4"/>
+      <a:schemeClr val="accent5"/>
+      <a:schemeClr val="accent6"/>
+    </dgm:fillClrLst>
+    <dgm:linClrLst meth="repeat">
+      <a:schemeClr val="lt1"/>
+    </dgm:linClrLst>
+    <dgm:effectClrLst/>
+    <dgm:txLinClrLst/>
+    <dgm:txFillClrLst/>
+    <dgm:txEffectClrLst/>
+  </dgm:styleLbl>
+  <dgm:styleLbl name="vennNode1">
+    <dgm:fillClrLst meth="repeat">
+      <a:schemeClr val="accent2">
+        <a:alpha val="50000"/>
+      </a:schemeClr>
+      <a:schemeClr val="accent3">
+        <a:alpha val="50000"/>
+      </a:schemeClr>
+      <a:schemeClr val="accent4">
+        <a:alpha val="50000"/>
+      </a:schemeClr>
+      <a:schemeClr val="accent5">
+        <a:alpha val="50000"/>
+      </a:schemeClr>
+      <a:schemeClr val="accent6">
+        <a:alpha val="50000"/>
+      </a:schemeClr>
+    </dgm:fillClrLst>
+    <dgm:linClrLst meth="repeat">
+      <a:schemeClr val="lt1"/>
+    </dgm:linClrLst>
+    <dgm:effectClrLst/>
+    <dgm:txLinClrLst/>
+    <dgm:txFillClrLst/>
+    <dgm:txEffectClrLst/>
+  </dgm:styleLbl>
+  <dgm:styleLbl name="node2">
+    <dgm:fillClrLst>
+      <a:schemeClr val="accent2"/>
+    </dgm:fillClrLst>
+    <dgm:linClrLst meth="repeat">
+      <a:schemeClr val="lt1"/>
+    </dgm:linClrLst>
+    <dgm:effectClrLst/>
+    <dgm:txLinClrLst/>
+    <dgm:txFillClrLst/>
+    <dgm:txEffectClrLst/>
+  </dgm:styleLbl>
+  <dgm:styleLbl name="node3">
+    <dgm:fillClrLst>
+      <a:schemeClr val="accent3"/>
+    </dgm:fillClrLst>
+    <dgm:linClrLst meth="repeat">
+      <a:schemeClr val="lt1"/>
+    </dgm:linClrLst>
+    <dgm:effectClrLst/>
+    <dgm:txLinClrLst/>
+    <dgm:txFillClrLst/>
+    <dgm:txEffectClrLst/>
+  </dgm:styleLbl>
+  <dgm:styleLbl name="node4">
+    <dgm:fillClrLst>
+      <a:schemeClr val="accent4"/>
+    </dgm:fillClrLst>
+    <dgm:linClrLst meth="repeat">
+      <a:schemeClr val="lt1"/>
+    </dgm:linClrLst>
+    <dgm:effectClrLst/>
+    <dgm:txLinClrLst/>
+    <dgm:txFillClrLst/>
+    <dgm:txEffectClrLst/>
+  </dgm:styleLbl>
+  <dgm:styleLbl name="fgImgPlace1">
+    <dgm:fillClrLst meth="repeat">
+      <a:schemeClr val="accent2">
+        <a:tint val="50000"/>
+      </a:schemeClr>
+      <a:schemeClr val="accent3">
+        <a:tint val="50000"/>
+      </a:schemeClr>
+      <a:schemeClr val="accent4">
+        <a:tint val="50000"/>
+      </a:schemeClr>
+      <a:schemeClr val="accent5">
+        <a:tint val="50000"/>
+      </a:schemeClr>
+      <a:schemeClr val="accent6">
+        <a:tint val="50000"/>
+      </a:schemeClr>
+    </dgm:fillClrLst>
+    <dgm:linClrLst meth="repeat">
+      <a:schemeClr val="lt1"/>
+    </dgm:linClrLst>
+    <dgm:effectClrLst/>
+    <dgm:txLinClrLst/>
+    <dgm:txFillClrLst meth="repeat">
+      <a:schemeClr val="lt1"/>
+    </dgm:txFillClrLst>
+    <dgm:txEffectClrLst/>
+  </dgm:styleLbl>
+  <dgm:styleLbl name="alignImgPlace1">
+    <dgm:fillClrLst>
+      <a:schemeClr val="accent1">
+        <a:tint val="50000"/>
+      </a:schemeClr>
+      <a:schemeClr val="accent2">
+        <a:tint val="20000"/>
+      </a:schemeClr>
+    </dgm:fillClrLst>
+    <dgm:linClrLst meth="repeat">
+      <a:schemeClr val="lt1"/>
+    </dgm:linClrLst>
+    <dgm:effectClrLst/>
+    <dgm:txLinClrLst/>
+    <dgm:txFillClrLst meth="repeat">
+      <a:schemeClr val="lt1"/>
+    </dgm:txFillClrLst>
+    <dgm:txEffectClrLst/>
+  </dgm:styleLbl>
+  <dgm:styleLbl name="bgImgPlace1">
+    <dgm:fillClrLst>
+      <a:schemeClr val="accent1">
+        <a:tint val="50000"/>
+      </a:schemeClr>
+      <a:schemeClr val="accent2">
+        <a:tint val="20000"/>
+      </a:schemeClr>
+    </dgm:fillClrLst>
+    <dgm:linClrLst meth="repeat">
+      <a:schemeClr val="lt1"/>
+    </dgm:linClrLst>
+    <dgm:effectClrLst/>
+    <dgm:txLinClrLst/>
+    <dgm:txFillClrLst meth="repeat">
+      <a:schemeClr val="lt1"/>
+    </dgm:txFillClrLst>
+    <dgm:txEffectClrLst/>
+  </dgm:styleLbl>
+  <dgm:styleLbl name="sibTrans2D1">
+    <dgm:fillClrLst meth="repeat">
+      <a:schemeClr val="accent2"/>
+      <a:schemeClr val="accent3"/>
+      <a:schemeClr val="accent4"/>
+      <a:schemeClr val="accent5"/>
+      <a:schemeClr val="accent6"/>
+    </dgm:fillClrLst>
+    <dgm:linClrLst meth="cycle">
+      <a:schemeClr val="lt1"/>
+    </dgm:linClrLst>
+    <dgm:effectClrLst/>
+    <dgm:txLinClrLst/>
+    <dgm:txFillClrLst/>
+    <dgm:txEffectClrLst/>
+  </dgm:styleLbl>
+  <dgm:styleLbl name="fgSibTrans2D1">
+    <dgm:fillClrLst meth="repeat">
+      <a:schemeClr val="accent2"/>
+      <a:schemeClr val="accent3"/>
+      <a:schemeClr val="accent4"/>
+      <a:schemeClr val="accent5"/>
+      <a:schemeClr val="accent6"/>
+    </dgm:fillClrLst>
+    <dgm:linClrLst meth="cycle">
+      <a:schemeClr val="lt1"/>
+    </dgm:linClrLst>
+    <dgm:effectClrLst/>
+    <dgm:txLinClrLst/>
+    <dgm:txFillClrLst meth="repeat">
+      <a:schemeClr val="lt1"/>
+    </dgm:txFillClrLst>
+    <dgm:txEffectClrLst/>
+  </dgm:styleLbl>
+  <dgm:styleLbl name="bgSibTrans2D1">
+    <dgm:fillClrLst meth="repeat">
+      <a:schemeClr val="accent2"/>
+      <a:schemeClr val="accent3"/>
+      <a:schemeClr val="accent4"/>
+      <a:schemeClr val="accent5"/>
+      <a:schemeClr val="accent6"/>
+    </dgm:fillClrLst>
+    <dgm:linClrLst meth="cycle">
+      <a:schemeClr val="lt1"/>
+    </dgm:linClrLst>
+    <dgm:effectClrLst/>
+    <dgm:txLinClrLst/>
+    <dgm:txFillClrLst meth="repeat">
+      <a:schemeClr val="lt1"/>
+    </dgm:txFillClrLst>
+    <dgm:txEffectClrLst/>
+  </dgm:styleLbl>
+  <dgm:styleLbl name="sibTrans1D1">
+    <dgm:fillClrLst meth="repeat">
+      <a:schemeClr val="accent2"/>
+      <a:schemeClr val="accent3"/>
+      <a:schemeClr val="accent4"/>
+      <a:schemeClr val="accent5"/>
+      <a:schemeClr val="accent6"/>
+    </dgm:fillClrLst>
+    <dgm:linClrLst meth="repeat">
+      <a:schemeClr val="accent2"/>
+      <a:schemeClr val="accent3"/>
+      <a:schemeClr val="accent4"/>
+      <a:schemeClr val="accent5"/>
+      <a:schemeClr val="accent6"/>
+    </dgm:linClrLst>
+    <dgm:effectClrLst/>
+    <dgm:txLinClrLst/>
+    <dgm:txFillClrLst meth="repeat">
+      <a:schemeClr val="tx1"/>
+    </dgm:txFillClrLst>
+    <dgm:txEffectClrLst/>
+  </dgm:styleLbl>
+  <dgm:styleLbl name="callout">
+    <dgm:fillClrLst meth="repeat">
+      <a:schemeClr val="accent2"/>
+    </dgm:fillClrLst>
+    <dgm:linClrLst meth="repeat">
+      <a:schemeClr val="accent2">
+        <a:tint val="50000"/>
+      </a:schemeClr>
+    </dgm:linClrLst>
+    <dgm:effectClrLst/>
+    <dgm:txLinClrLst/>
+    <dgm:txFillClrLst meth="repeat">
+      <a:schemeClr val="tx1"/>
+    </dgm:txFillClrLst>
+    <dgm:txEffectClrLst/>
+  </dgm:styleLbl>
+  <dgm:styleLbl name="asst0">
+    <dgm:fillClrLst meth="repeat">
+      <a:schemeClr val="accent1"/>
+    </dgm:fillClrLst>
+    <dgm:linClrLst meth="repeat">
+      <a:schemeClr val="lt1"/>
+    </dgm:linClrLst>
+    <dgm:effectClrLst/>
+    <dgm:txLinClrLst/>
+    <dgm:txFillClrLst/>
+    <dgm:txEffectClrLst/>
+  </dgm:styleLbl>
+  <dgm:styleLbl name="asst1">
+    <dgm:fillClrLst meth="repeat">
+      <a:schemeClr val="accent2"/>
+    </dgm:fillClrLst>
+    <dgm:linClrLst meth="repeat">
+      <a:schemeClr val="lt1"/>
+    </dgm:linClrLst>
+    <dgm:effectClrLst/>
+    <dgm:txLinClrLst/>
+    <dgm:txFillClrLst/>
+    <dgm:txEffectClrLst/>
+  </dgm:styleLbl>
+  <dgm:styleLbl name="asst2">
+    <dgm:fillClrLst>
+      <a:schemeClr val="accent3"/>
+    </dgm:fillClrLst>
+    <dgm:linClrLst meth="repeat">
+      <a:schemeClr val="lt1"/>
+    </dgm:linClrLst>
+    <dgm:effectClrLst/>
+    <dgm:txLinClrLst/>
+    <dgm:txFillClrLst/>
+    <dgm:txEffectClrLst/>
+  </dgm:styleLbl>
+  <dgm:styleLbl name="asst3">
+    <dgm:fillClrLst>
+      <a:schemeClr val="accent4"/>
+    </dgm:fillClrLst>
+    <dgm:linClrLst meth="repeat">
+      <a:schemeClr val="lt1"/>
+    </dgm:linClrLst>
+    <dgm:effectClrLst/>
+    <dgm:txLinClrLst/>
+    <dgm:txFillClrLst/>
+    <dgm:txEffectClrLst/>
+  </dgm:styleLbl>
+  <dgm:styleLbl name="asst4">
+    <dgm:fillClrLst>
+      <a:schemeClr val="accent5"/>
+    </dgm:fillClrLst>
+    <dgm:linClrLst meth="repeat">
+      <a:schemeClr val="lt1"/>
+    </dgm:linClrLst>
+    <dgm:effectClrLst/>
+    <dgm:txLinClrLst/>
+    <dgm:txFillClrLst/>
+    <dgm:txEffectClrLst/>
+  </dgm:styleLbl>
+  <dgm:styleLbl name="parChTrans2D1">
+    <dgm:fillClrLst meth="repeat">
+      <a:schemeClr val="accent2"/>
+    </dgm:fillClrLst>
+    <dgm:linClrLst meth="repeat">
+      <a:schemeClr val="lt1"/>
+    </dgm:linClrLst>
+    <dgm:effectClrLst/>
+    <dgm:txLinClrLst/>
+    <dgm:txFillClrLst meth="repeat">
+      <a:schemeClr val="lt1"/>
+    </dgm:txFillClrLst>
+    <dgm:txEffectClrLst/>
+  </dgm:styleLbl>
+  <dgm:styleLbl name="parChTrans2D2">
+    <dgm:fillClrLst meth="repeat">
+      <a:schemeClr val="accent3"/>
+    </dgm:fillClrLst>
+    <dgm:linClrLst meth="repeat">
+      <a:schemeClr val="lt1"/>
+    </dgm:linClrLst>
+    <dgm:effectClrLst/>
+    <dgm:txLinClrLst/>
+    <dgm:txFillClrLst/>
+    <dgm:txEffectClrLst/>
+  </dgm:styleLbl>
+  <dgm:styleLbl name="parChTrans2D3">
+    <dgm:fillClrLst meth="repeat">
+      <a:schemeClr val="accent4"/>
+    </dgm:fillClrLst>
+    <dgm:linClrLst meth="repeat">
+      <a:schemeClr val="lt1"/>
+    </dgm:linClrLst>
+    <dgm:effectClrLst/>
+    <dgm:txLinClrLst/>
+    <dgm:txFillClrLst/>
+    <dgm:txEffectClrLst/>
+  </dgm:styleLbl>
+  <dgm:styleLbl name="parChTrans2D4">
+    <dgm:fillClrLst meth="repeat">
+      <a:schemeClr val="accent5"/>
+    </dgm:fillClrLst>
+    <dgm:linClrLst meth="repeat">
+      <a:schemeClr val="lt1"/>
+    </dgm:linClrLst>
+    <dgm:effectClrLst/>
+    <dgm:txLinClrLst/>
+    <dgm:txFillClrLst meth="repeat">
+      <a:schemeClr val="lt1"/>
+    </dgm:txFillClrLst>
+    <dgm:txEffectClrLst/>
+  </dgm:styleLbl>
+  <dgm:styleLbl name="parChTrans1D1">
+    <dgm:fillClrLst meth="repeat">
+      <a:schemeClr val="accent2"/>
+    </dgm:fillClrLst>
+    <dgm:linClrLst meth="repeat">
+      <a:schemeClr val="accent1"/>
+    </dgm:linClrLst>
+    <dgm:effectClrLst/>
+    <dgm:txLinClrLst/>
+    <dgm:txFillClrLst meth="repeat">
+      <a:schemeClr val="tx1"/>
+    </dgm:txFillClrLst>
+    <dgm:txEffectClrLst/>
+  </dgm:styleLbl>
+  <dgm:styleLbl name="parChTrans1D2">
+    <dgm:fillClrLst meth="repeat">
+      <a:schemeClr val="accent3">
+        <a:tint val="90000"/>
+      </a:schemeClr>
+    </dgm:fillClrLst>
+    <dgm:linClrLst meth="repeat">
+      <a:schemeClr val="accent2"/>
+    </dgm:linClrLst>
+    <dgm:effectClrLst/>
+    <dgm:txLinClrLst/>
+    <dgm:txFillClrLst meth="repeat">
+      <a:schemeClr val="tx1"/>
+    </dgm:txFillClrLst>
+    <dgm:txEffectClrLst/>
+  </dgm:styleLbl>
+  <dgm:styleLbl name="parChTrans1D3">
+    <dgm:fillClrLst meth="repeat">
+      <a:schemeClr val="accent4">
+        <a:tint val="70000"/>
+      </a:schemeClr>
+    </dgm:fillClrLst>
+    <dgm:linClrLst meth="repeat">
+      <a:schemeClr val="accent3"/>
+    </dgm:linClrLst>
+    <dgm:effectClrLst/>
+    <dgm:txLinClrLst/>
+    <dgm:txFillClrLst meth="repeat">
+      <a:schemeClr val="tx1"/>
+    </dgm:txFillClrLst>
+    <dgm:txEffectClrLst/>
+  </dgm:styleLbl>
+  <dgm:styleLbl name="parChTrans1D4">
+    <dgm:fillClrLst meth="repeat">
+      <a:schemeClr val="accent5">
+        <a:tint val="50000"/>
+      </a:schemeClr>
+    </dgm:fillClrLst>
+    <dgm:linClrLst meth="repeat">
+      <a:schemeClr val="accent4"/>
+    </dgm:linClrLst>
+    <dgm:effectClrLst/>
+    <dgm:txLinClrLst/>
+    <dgm:txFillClrLst meth="repeat">
+      <a:schemeClr val="tx1"/>
+    </dgm:txFillClrLst>
+    <dgm:txEffectClrLst/>
+  </dgm:styleLbl>
+  <dgm:styleLbl name="fgAcc1">
+    <dgm:fillClrLst meth="repeat">
+      <a:schemeClr val="lt1">
+        <a:alpha val="90000"/>
+      </a:schemeClr>
+    </dgm:fillClrLst>
+    <dgm:linClrLst meth="repeat">
+      <a:schemeClr val="accent2"/>
+      <a:schemeClr val="accent3"/>
+      <a:schemeClr val="accent4"/>
+      <a:schemeClr val="accent5"/>
+      <a:schemeClr val="accent6"/>
+    </dgm:linClrLst>
+    <dgm:effectClrLst/>
+    <dgm:txLinClrLst/>
+    <dgm:txFillClrLst meth="repeat">
+      <a:schemeClr val="dk1"/>
+    </dgm:txFillClrLst>
+    <dgm:txEffectClrLst/>
+  </dgm:styleLbl>
+  <dgm:styleLbl name="conFgAcc1">
+    <dgm:fillClrLst meth="repeat">
+      <a:schemeClr val="lt1">
+        <a:alpha val="90000"/>
+      </a:schemeClr>
+    </dgm:fillClrLst>
+    <dgm:linClrLst meth="repeat">
+      <a:schemeClr val="accent2"/>
+      <a:schemeClr val="accent3"/>
+      <a:schemeClr val="accent4"/>
+      <a:schemeClr val="accent5"/>
+      <a:schemeClr val="accent6"/>
+    </dgm:linClrLst>
+    <dgm:effectClrLst/>
+    <dgm:txLinClrLst/>
+    <dgm:txFillClrLst meth="repeat">
+      <a:schemeClr val="dk1"/>
+    </dgm:txFillClrLst>
+    <dgm:txEffectClrLst/>
+  </dgm:styleLbl>
+  <dgm:styleLbl name="alignAcc1">
+    <dgm:fillClrLst meth="repeat">
+      <a:schemeClr val="lt1">
+        <a:alpha val="90000"/>
+      </a:schemeClr>
+    </dgm:fillClrLst>
+    <dgm:linClrLst meth="repeat">
+      <a:schemeClr val="accent2"/>
+      <a:schemeClr val="accent3"/>
+      <a:schemeClr val="accent4"/>
+      <a:schemeClr val="accent5"/>
+      <a:schemeClr val="accent6"/>
+    </dgm:linClrLst>
+    <dgm:effectClrLst/>
+    <dgm:txLinClrLst/>
+    <dgm:txFillClrLst meth="repeat">
+      <a:schemeClr val="dk1"/>
+    </dgm:txFillClrLst>
+    <dgm:txEffectClrLst/>
+  </dgm:styleLbl>
+  <dgm:styleLbl name="trAlignAcc1">
+    <dgm:fillClrLst meth="repeat">
+      <a:schemeClr val="lt1">
+        <a:alpha val="40000"/>
+      </a:schemeClr>
+    </dgm:fillClrLst>
+    <dgm:linClrLst meth="repeat">
+      <a:schemeClr val="accent1"/>
+    </dgm:linClrLst>
+    <dgm:effectClrLst/>
+    <dgm:txLinClrLst/>
+    <dgm:txFillClrLst meth="repeat">
+      <a:schemeClr val="dk1"/>
+    </dgm:txFillClrLst>
+    <dgm:txEffectClrLst/>
+  </dgm:styleLbl>
+  <dgm:styleLbl name="bgAcc1">
+    <dgm:fillClrLst meth="repeat">
+      <a:schemeClr val="lt1">
+        <a:alpha val="90000"/>
+      </a:schemeClr>
+    </dgm:fillClrLst>
+    <dgm:linClrLst meth="repeat">
+      <a:schemeClr val="accent2"/>
+      <a:schemeClr val="accent3"/>
+      <a:schemeClr val="accent4"/>
+      <a:schemeClr val="accent5"/>
+      <a:schemeClr val="accent6"/>
+    </dgm:linClrLst>
+    <dgm:effectClrLst/>
+    <dgm:txLinClrLst/>
+    <dgm:txFillClrLst meth="repeat">
+      <a:schemeClr val="dk1"/>
+    </dgm:txFillClrLst>
+    <dgm:txEffectClrLst/>
+  </dgm:styleLbl>
+  <dgm:styleLbl name="solidFgAcc1">
+    <dgm:fillClrLst meth="repeat">
+      <a:schemeClr val="lt1"/>
+    </dgm:fillClrLst>
+    <dgm:linClrLst meth="repeat">
+      <a:schemeClr val="accent2"/>
+      <a:schemeClr val="accent3"/>
+      <a:schemeClr val="accent4"/>
+      <a:schemeClr val="accent5"/>
+      <a:schemeClr val="accent6"/>
+    </dgm:linClrLst>
+    <dgm:effectClrLst/>
+    <dgm:txLinClrLst/>
+    <dgm:txFillClrLst meth="repeat">
+      <a:schemeClr val="dk1"/>
+    </dgm:txFillClrLst>
+    <dgm:txEffectClrLst/>
+  </dgm:styleLbl>
+  <dgm:styleLbl name="solidAlignAcc1">
+    <dgm:fillClrLst meth="repeat">
+      <a:schemeClr val="lt1"/>
+    </dgm:fillClrLst>
+    <dgm:linClrLst meth="repeat">
+      <a:schemeClr val="accent2"/>
+      <a:schemeClr val="accent3"/>
+      <a:schemeClr val="accent4"/>
+      <a:schemeClr val="accent5"/>
+      <a:schemeClr val="accent6"/>
+    </dgm:linClrLst>
+    <dgm:effectClrLst/>
+    <dgm:txLinClrLst/>
+    <dgm:txFillClrLst meth="repeat">
+      <a:schemeClr val="dk1"/>
+    </dgm:txFillClrLst>
+    <dgm:txEffectClrLst/>
+  </dgm:styleLbl>
+  <dgm:styleLbl name="solidBgAcc1">
+    <dgm:fillClrLst meth="repeat">
+      <a:schemeClr val="lt1"/>
+    </dgm:fillClrLst>
+    <dgm:linClrLst meth="repeat">
+      <a:schemeClr val="accent2"/>
+      <a:schemeClr val="accent3"/>
+      <a:schemeClr val="accent4"/>
+      <a:schemeClr val="accent5"/>
+      <a:schemeClr val="accent6"/>
+    </dgm:linClrLst>
+    <dgm:effectClrLst/>
+    <dgm:txLinClrLst/>
+    <dgm:txFillClrLst meth="repeat">
+      <a:schemeClr val="dk1"/>
+    </dgm:txFillClrLst>
+    <dgm:txEffectClrLst/>
+  </dgm:styleLbl>
+  <dgm:styleLbl name="fgAccFollowNode1">
+    <dgm:fillClrLst meth="repeat">
+      <a:schemeClr val="accent2">
+        <a:tint val="40000"/>
+        <a:alpha val="90000"/>
+      </a:schemeClr>
+      <a:schemeClr val="accent3">
+        <a:tint val="40000"/>
+        <a:alpha val="90000"/>
+      </a:schemeClr>
+      <a:schemeClr val="accent4">
+        <a:tint val="40000"/>
+        <a:alpha val="90000"/>
+      </a:schemeClr>
+      <a:schemeClr val="accent5">
+        <a:tint val="40000"/>
+        <a:alpha val="90000"/>
+      </a:schemeClr>
+      <a:schemeClr val="accent6">
+        <a:tint val="40000"/>
+        <a:alpha val="90000"/>
+      </a:schemeClr>
+    </dgm:fillClrLst>
+    <dgm:linClrLst meth="repeat">
+      <a:schemeClr val="accent2">
+        <a:tint val="40000"/>
+        <a:alpha val="90000"/>
+      </a:schemeClr>
+      <a:schemeClr val="accent3">
+        <a:tint val="40000"/>
+        <a:alpha val="90000"/>
+      </a:schemeClr>
+      <a:schemeClr val="accent4">
+        <a:tint val="40000"/>
+        <a:alpha val="90000"/>
+      </a:schemeClr>
+      <a:schemeClr val="accent5">
+        <a:tint val="40000"/>
+        <a:alpha val="90000"/>
+      </a:schemeClr>
+      <a:schemeClr val="accent6">
+        <a:tint val="40000"/>
+        <a:alpha val="90000"/>
+      </a:schemeClr>
+    </dgm:linClrLst>
+    <dgm:effectClrLst/>
+    <dgm:txLinClrLst/>
+    <dgm:txFillClrLst meth="repeat">
+      <a:schemeClr val="dk1"/>
+    </dgm:txFillClrLst>
+    <dgm:txEffectClrLst/>
+  </dgm:styleLbl>
+  <dgm:styleLbl name="alignAccFollowNode1">
+    <dgm:fillClrLst meth="repeat">
+      <a:schemeClr val="accent2">
+        <a:tint val="40000"/>
+        <a:alpha val="90000"/>
+      </a:schemeClr>
+      <a:schemeClr val="accent3">
+        <a:tint val="40000"/>
+        <a:alpha val="90000"/>
+      </a:schemeClr>
+      <a:schemeClr val="accent4">
+        <a:tint val="40000"/>
+        <a:alpha val="90000"/>
+      </a:schemeClr>
+      <a:schemeClr val="accent5">
+        <a:tint val="40000"/>
+        <a:alpha val="90000"/>
+      </a:schemeClr>
+      <a:schemeClr val="accent6">
+        <a:tint val="40000"/>
+        <a:alpha val="90000"/>
+      </a:schemeClr>
+    </dgm:fillClrLst>
+    <dgm:linClrLst meth="repeat">
+      <a:schemeClr val="accent2">
+        <a:tint val="40000"/>
+        <a:alpha val="90000"/>
+      </a:schemeClr>
+      <a:schemeClr val="accent3">
+        <a:tint val="40000"/>
+        <a:alpha val="90000"/>
+      </a:schemeClr>
+      <a:schemeClr val="accent4">
+        <a:tint val="40000"/>
+        <a:alpha val="90000"/>
+      </a:schemeClr>
+      <a:schemeClr val="accent5">
+        <a:tint val="40000"/>
+        <a:alpha val="90000"/>
+      </a:schemeClr>
+      <a:schemeClr val="accent6">
+        <a:tint val="40000"/>
+        <a:alpha val="90000"/>
+      </a:schemeClr>
+    </dgm:linClrLst>
+    <dgm:effectClrLst/>
+    <dgm:txLinClrLst/>
+    <dgm:txFillClrLst meth="repeat">
+      <a:schemeClr val="dk1"/>
+    </dgm:txFillClrLst>
+    <dgm:txEffectClrLst/>
+  </dgm:styleLbl>
+  <dgm:styleLbl name="bgAccFollowNode1">
+    <dgm:fillClrLst meth="repeat">
+      <a:schemeClr val="accent2">
+        <a:tint val="40000"/>
+        <a:alpha val="90000"/>
+      </a:schemeClr>
+      <a:schemeClr val="accent3">
+        <a:tint val="40000"/>
+        <a:alpha val="90000"/>
+      </a:schemeClr>
+      <a:schemeClr val="accent4">
+        <a:tint val="40000"/>
+        <a:alpha val="90000"/>
+      </a:schemeClr>
+      <a:schemeClr val="accent5">
+        <a:tint val="40000"/>
+        <a:alpha val="90000"/>
+      </a:schemeClr>
+      <a:schemeClr val="accent6">
+        <a:tint val="40000"/>
+        <a:alpha val="90000"/>
+      </a:schemeClr>
+    </dgm:fillClrLst>
+    <dgm:linClrLst meth="repeat">
+      <a:schemeClr val="accent2">
+        <a:tint val="40000"/>
+        <a:alpha val="90000"/>
+      </a:schemeClr>
+      <a:schemeClr val="accent3">
+        <a:tint val="40000"/>
+        <a:alpha val="90000"/>
+      </a:schemeClr>
+      <a:schemeClr val="accent4">
+        <a:tint val="40000"/>
+        <a:alpha val="90000"/>
+      </a:schemeClr>
+      <a:schemeClr val="accent5">
+        <a:tint val="40000"/>
+        <a:alpha val="90000"/>
+      </a:schemeClr>
+      <a:schemeClr val="accent6">
+        <a:tint val="40000"/>
+        <a:alpha val="90000"/>
+      </a:schemeClr>
+    </dgm:linClrLst>
+    <dgm:effectClrLst/>
+    <dgm:txLinClrLst/>
+    <dgm:txFillClrLst meth="repeat">
+      <a:schemeClr val="dk1"/>
+    </dgm:txFillClrLst>
+    <dgm:txEffectClrLst/>
+  </dgm:styleLbl>
+  <dgm:styleLbl name="fgAcc0">
+    <dgm:fillClrLst meth="repeat">
+      <a:schemeClr val="lt1">
+        <a:alpha val="90000"/>
+      </a:schemeClr>
+    </dgm:fillClrLst>
+    <dgm:linClrLst>
+      <a:schemeClr val="accent1"/>
+    </dgm:linClrLst>
+    <dgm:effectClrLst/>
+    <dgm:txLinClrLst/>
+    <dgm:txFillClrLst meth="repeat">
+      <a:schemeClr val="dk1"/>
+    </dgm:txFillClrLst>
+    <dgm:txEffectClrLst/>
+  </dgm:styleLbl>
+  <dgm:styleLbl name="fgAcc2">
+    <dgm:fillClrLst meth="repeat">
+      <a:schemeClr val="lt1">
+        <a:alpha val="90000"/>
+      </a:schemeClr>
+    </dgm:fillClrLst>
+    <dgm:linClrLst>
+      <a:schemeClr val="accent2"/>
+    </dgm:linClrLst>
+    <dgm:effectClrLst/>
+    <dgm:txLinClrLst/>
+    <dgm:txFillClrLst meth="repeat">
+      <a:schemeClr val="dk1"/>
+    </dgm:txFillClrLst>
+    <dgm:txEffectClrLst/>
+  </dgm:styleLbl>
+  <dgm:styleLbl name="fgAcc3">
+    <dgm:fillClrLst meth="repeat">
+      <a:schemeClr val="lt1">
+        <a:alpha val="90000"/>
+      </a:schemeClr>
+    </dgm:fillClrLst>
+    <dgm:linClrLst>
+      <a:schemeClr val="accent3"/>
+    </dgm:linClrLst>
+    <dgm:effectClrLst/>
+    <dgm:txLinClrLst/>
+    <dgm:txFillClrLst meth="repeat">
+      <a:schemeClr val="dk1"/>
+    </dgm:txFillClrLst>
+    <dgm:txEffectClrLst/>
+  </dgm:styleLbl>
+  <dgm:styleLbl name="fgAcc4">
+    <dgm:fillClrLst meth="repeat">
+      <a:schemeClr val="lt1">
+        <a:alpha val="90000"/>
+      </a:schemeClr>
+    </dgm:fillClrLst>
+    <dgm:linClrLst>
+      <a:schemeClr val="accent4"/>
+    </dgm:linClrLst>
+    <dgm:effectClrLst/>
+    <dgm:txLinClrLst/>
+    <dgm:txFillClrLst meth="repeat">
+      <a:schemeClr val="dk1"/>
+    </dgm:txFillClrLst>
+    <dgm:txEffectClrLst/>
+  </dgm:styleLbl>
+  <dgm:styleLbl name="bgShp">
+    <dgm:fillClrLst meth="repeat">
+      <a:schemeClr val="accent2">
+        <a:tint val="40000"/>
+      </a:schemeClr>
+    </dgm:fillClrLst>
+    <dgm:linClrLst meth="repeat">
+      <a:schemeClr val="dk1"/>
+    </dgm:linClrLst>
+    <dgm:effectClrLst/>
+    <dgm:txLinClrLst/>
+    <dgm:txFillClrLst meth="repeat">
+      <a:schemeClr val="dk1"/>
+    </dgm:txFillClrLst>
+    <dgm:txEffectClrLst/>
+  </dgm:styleLbl>
+  <dgm:styleLbl name="dkBgShp">
+    <dgm:fillClrLst meth="repeat">
+      <a:schemeClr val="accent2">
+        <a:shade val="90000"/>
+      </a:schemeClr>
+    </dgm:fillClrLst>
+    <dgm:linClrLst meth="repeat">
+      <a:schemeClr val="dk1"/>
+    </dgm:linClrLst>
+    <dgm:effectClrLst/>
+    <dgm:txLinClrLst/>
+    <dgm:txFillClrLst meth="repeat">
+      <a:schemeClr val="lt1"/>
+    </dgm:txFillClrLst>
+    <dgm:txEffectClrLst/>
+  </dgm:styleLbl>
+  <dgm:styleLbl name="trBgShp">
+    <dgm:fillClrLst meth="repeat">
+      <a:schemeClr val="accent1">
+        <a:tint val="50000"/>
+        <a:alpha val="40000"/>
+      </a:schemeClr>
+    </dgm:fillClrLst>
+    <dgm:linClrLst meth="repeat">
+      <a:schemeClr val="accent2"/>
+    </dgm:linClrLst>
+    <dgm:effectClrLst/>
+    <dgm:txLinClrLst/>
+    <dgm:txFillClrLst meth="repeat">
+      <a:schemeClr val="lt1"/>
+    </dgm:txFillClrLst>
+    <dgm:txEffectClrLst/>
+  </dgm:styleLbl>
+  <dgm:styleLbl name="fgShp">
+    <dgm:fillClrLst meth="repeat">
+      <a:schemeClr val="accent2">
+        <a:tint val="40000"/>
+      </a:schemeClr>
+    </dgm:fillClrLst>
+    <dgm:linClrLst meth="repeat">
+      <a:schemeClr val="lt1"/>
+    </dgm:linClrLst>
+    <dgm:effectClrLst/>
+    <dgm:txLinClrLst/>
+    <dgm:txFillClrLst meth="repeat">
+      <a:schemeClr val="dk1"/>
+    </dgm:txFillClrLst>
+    <dgm:txEffectClrLst/>
+  </dgm:styleLbl>
+  <dgm:styleLbl name="revTx">
+    <dgm:fillClrLst meth="repeat">
+      <a:schemeClr val="lt1">
+        <a:alpha val="0"/>
+      </a:schemeClr>
+    </dgm:fillClrLst>
+    <dgm:linClrLst meth="repeat">
+      <a:schemeClr val="dk1">
+        <a:alpha val="0"/>
+      </a:schemeClr>
+    </dgm:linClrLst>
+    <dgm:effectClrLst/>
+    <dgm:txLinClrLst/>
+    <dgm:txFillClrLst meth="repeat">
+      <a:schemeClr val="tx1"/>
+    </dgm:txFillClrLst>
+    <dgm:txEffectClrLst/>
+  </dgm:styleLbl>
+</dgm:colorsDef>
+</file>
+
+<file path=ppt/diagrams/data1.xml><?xml version="1.0" encoding="utf-8"?>
+<dgm:dataModel xmlns:dgm="http://schemas.openxmlformats.org/drawingml/2006/diagram" xmlns:a="http://schemas.openxmlformats.org/drawingml/2006/main">
+  <dgm:ptLst>
+    <dgm:pt modelId="{683371B2-C2AA-DB43-9854-31EEF0575116}" type="doc">
+      <dgm:prSet loTypeId="urn:microsoft.com/office/officeart/2005/8/layout/radial3" loCatId="" qsTypeId="urn:microsoft.com/office/officeart/2005/8/quickstyle/simple4" qsCatId="simple" csTypeId="urn:microsoft.com/office/officeart/2005/8/colors/colorful1" csCatId="colorful" phldr="1"/>
+      <dgm:spPr/>
+      <dgm:t>
+        <a:bodyPr/>
+        <a:lstStyle/>
+        <a:p>
+          <a:endParaRPr lang="en-US"/>
+        </a:p>
+      </dgm:t>
+    </dgm:pt>
+    <dgm:pt modelId="{69DD41FD-F34F-3E42-A2D4-4AE4517F389B}">
+      <dgm:prSet phldrT="[Text]"/>
+      <dgm:spPr/>
+      <dgm:t>
+        <a:bodyPr/>
+        <a:lstStyle/>
+        <a:p>
+          <a:r>
+            <a:rPr lang="en-US" dirty="0" smtClean="0"/>
+            <a:t>EC2 Container Services (ECS)</a:t>
+          </a:r>
+          <a:endParaRPr lang="en-US" dirty="0"/>
+        </a:p>
+      </dgm:t>
+    </dgm:pt>
+    <dgm:pt modelId="{4E5F3E44-5970-A94A-A35E-096869EAD1EA}" type="parTrans" cxnId="{03D330E5-5CC6-FA49-9B9A-D2F9D207D1E4}">
+      <dgm:prSet/>
+      <dgm:spPr/>
+      <dgm:t>
+        <a:bodyPr/>
+        <a:lstStyle/>
+        <a:p>
+          <a:endParaRPr lang="en-US"/>
+        </a:p>
+      </dgm:t>
+    </dgm:pt>
+    <dgm:pt modelId="{3A9439D1-1AB3-3F45-8542-92F3027CCCA7}" type="sibTrans" cxnId="{03D330E5-5CC6-FA49-9B9A-D2F9D207D1E4}">
+      <dgm:prSet/>
+      <dgm:spPr/>
+      <dgm:t>
+        <a:bodyPr/>
+        <a:lstStyle/>
+        <a:p>
+          <a:endParaRPr lang="en-US"/>
+        </a:p>
+      </dgm:t>
+    </dgm:pt>
+    <dgm:pt modelId="{0816358B-4D3A-2F44-B5C3-D19D4A4D34C2}">
+      <dgm:prSet phldrT="[Text]"/>
+      <dgm:spPr/>
+      <dgm:t>
+        <a:bodyPr/>
+        <a:lstStyle/>
+        <a:p>
+          <a:r>
+            <a:rPr lang="en-US" dirty="0" smtClean="0"/>
+            <a:t>Container Instance</a:t>
+          </a:r>
+          <a:endParaRPr lang="en-US" dirty="0"/>
+        </a:p>
+      </dgm:t>
+    </dgm:pt>
+    <dgm:pt modelId="{60727A49-B3F4-3742-8EC9-45F4B43DA2FA}" type="parTrans" cxnId="{50788EAB-D68B-2E4E-B8EC-7285BEE85859}">
+      <dgm:prSet/>
+      <dgm:spPr/>
+      <dgm:t>
+        <a:bodyPr/>
+        <a:lstStyle/>
+        <a:p>
+          <a:endParaRPr lang="en-US"/>
+        </a:p>
+      </dgm:t>
+    </dgm:pt>
+    <dgm:pt modelId="{74F2DDDB-D42E-6247-B3A6-6E6F3002A377}" type="sibTrans" cxnId="{50788EAB-D68B-2E4E-B8EC-7285BEE85859}">
+      <dgm:prSet/>
+      <dgm:spPr/>
+      <dgm:t>
+        <a:bodyPr/>
+        <a:lstStyle/>
+        <a:p>
+          <a:endParaRPr lang="en-US"/>
+        </a:p>
+      </dgm:t>
+    </dgm:pt>
+    <dgm:pt modelId="{0430650A-DEE1-7049-BE2B-D51C6D6EF916}">
+      <dgm:prSet phldrT="[Text]"/>
+      <dgm:spPr/>
+      <dgm:t>
+        <a:bodyPr/>
+        <a:lstStyle/>
+        <a:p>
+          <a:r>
+            <a:rPr lang="en-US" dirty="0" smtClean="0"/>
+            <a:t>Cluster</a:t>
+          </a:r>
+          <a:endParaRPr lang="en-US" dirty="0"/>
+        </a:p>
+      </dgm:t>
+    </dgm:pt>
+    <dgm:pt modelId="{AB5AF7CA-0473-F440-AB97-381CDBAA68F9}" type="parTrans" cxnId="{0B4B52CC-5C8B-074C-B83C-3A2BB46DB1FA}">
+      <dgm:prSet/>
+      <dgm:spPr/>
+      <dgm:t>
+        <a:bodyPr/>
+        <a:lstStyle/>
+        <a:p>
+          <a:endParaRPr lang="en-US"/>
+        </a:p>
+      </dgm:t>
+    </dgm:pt>
+    <dgm:pt modelId="{1F37CFCB-F0E1-EF4A-9DAB-2C1F59A64ECB}" type="sibTrans" cxnId="{0B4B52CC-5C8B-074C-B83C-3A2BB46DB1FA}">
+      <dgm:prSet/>
+      <dgm:spPr/>
+      <dgm:t>
+        <a:bodyPr/>
+        <a:lstStyle/>
+        <a:p>
+          <a:endParaRPr lang="en-US"/>
+        </a:p>
+      </dgm:t>
+    </dgm:pt>
+    <dgm:pt modelId="{4E002EB9-9A73-DD43-94E1-C49964D9F166}">
+      <dgm:prSet phldrT="[Text]"/>
+      <dgm:spPr/>
+      <dgm:t>
+        <a:bodyPr/>
+        <a:lstStyle/>
+        <a:p>
+          <a:r>
+            <a:rPr lang="en-US" dirty="0" smtClean="0"/>
+            <a:t>Task Definition</a:t>
+          </a:r>
+          <a:endParaRPr lang="en-US" dirty="0"/>
+        </a:p>
+      </dgm:t>
+    </dgm:pt>
+    <dgm:pt modelId="{90DD2ADA-48DF-D040-BF95-D638D4E2BA24}" type="parTrans" cxnId="{F8CFC8A3-7428-C249-91F8-9A4873954A65}">
+      <dgm:prSet/>
+      <dgm:spPr/>
+      <dgm:t>
+        <a:bodyPr/>
+        <a:lstStyle/>
+        <a:p>
+          <a:endParaRPr lang="en-US"/>
+        </a:p>
+      </dgm:t>
+    </dgm:pt>
+    <dgm:pt modelId="{C955496F-2F19-C24C-AB66-2D17AB54D618}" type="sibTrans" cxnId="{F8CFC8A3-7428-C249-91F8-9A4873954A65}">
+      <dgm:prSet/>
+      <dgm:spPr/>
+      <dgm:t>
+        <a:bodyPr/>
+        <a:lstStyle/>
+        <a:p>
+          <a:endParaRPr lang="en-US"/>
+        </a:p>
+      </dgm:t>
+    </dgm:pt>
+    <dgm:pt modelId="{A9FF6EFD-54BD-1B42-9896-63D2CC49629E}">
+      <dgm:prSet phldrT="[Text]"/>
+      <dgm:spPr/>
+      <dgm:t>
+        <a:bodyPr/>
+        <a:lstStyle/>
+        <a:p>
+          <a:r>
+            <a:rPr lang="en-US" dirty="0" smtClean="0"/>
+            <a:t>Task</a:t>
+          </a:r>
+          <a:endParaRPr lang="en-US" dirty="0"/>
+        </a:p>
+      </dgm:t>
+    </dgm:pt>
+    <dgm:pt modelId="{9F7C346E-70AA-3442-813D-970D6EF4B0AC}" type="parTrans" cxnId="{7A1A28CA-5102-144D-A5E3-841D3AD30C31}">
+      <dgm:prSet/>
+      <dgm:spPr/>
+      <dgm:t>
+        <a:bodyPr/>
+        <a:lstStyle/>
+        <a:p>
+          <a:endParaRPr lang="en-US"/>
+        </a:p>
+      </dgm:t>
+    </dgm:pt>
+    <dgm:pt modelId="{B069F184-77FD-F643-A1ED-F5E39034AFB6}" type="sibTrans" cxnId="{7A1A28CA-5102-144D-A5E3-841D3AD30C31}">
+      <dgm:prSet/>
+      <dgm:spPr/>
+      <dgm:t>
+        <a:bodyPr/>
+        <a:lstStyle/>
+        <a:p>
+          <a:endParaRPr lang="en-US"/>
+        </a:p>
+      </dgm:t>
+    </dgm:pt>
+    <dgm:pt modelId="{9179CDE9-7537-0C48-8BB9-87173F9F69A7}">
+      <dgm:prSet phldrT="[Text]"/>
+      <dgm:spPr/>
+      <dgm:t>
+        <a:bodyPr/>
+        <a:lstStyle/>
+        <a:p>
+          <a:r>
+            <a:rPr lang="en-US" dirty="0" smtClean="0"/>
+            <a:t>Service</a:t>
+          </a:r>
+          <a:endParaRPr lang="en-US" dirty="0"/>
+        </a:p>
+      </dgm:t>
+    </dgm:pt>
+    <dgm:pt modelId="{E1BB4AC7-11C1-B44E-9F5D-2BA24DE341AB}" type="parTrans" cxnId="{E2C9DC83-800A-1543-8110-CA729736C58E}">
+      <dgm:prSet/>
+      <dgm:spPr/>
+      <dgm:t>
+        <a:bodyPr/>
+        <a:lstStyle/>
+        <a:p>
+          <a:endParaRPr lang="en-US"/>
+        </a:p>
+      </dgm:t>
+    </dgm:pt>
+    <dgm:pt modelId="{A66C6D08-B66A-7F49-A5DF-3910A6434674}" type="sibTrans" cxnId="{E2C9DC83-800A-1543-8110-CA729736C58E}">
+      <dgm:prSet/>
+      <dgm:spPr/>
+      <dgm:t>
+        <a:bodyPr/>
+        <a:lstStyle/>
+        <a:p>
+          <a:endParaRPr lang="en-US"/>
+        </a:p>
+      </dgm:t>
+    </dgm:pt>
+    <dgm:pt modelId="{B8ED3405-4AD3-9942-9811-C9289EC33BBD}">
+      <dgm:prSet phldrT="[Text]"/>
+      <dgm:spPr/>
+      <dgm:t>
+        <a:bodyPr/>
+        <a:lstStyle/>
+        <a:p>
+          <a:r>
+            <a:rPr lang="en-US" smtClean="0"/>
+            <a:t>Repository</a:t>
+          </a:r>
+          <a:endParaRPr lang="en-US" dirty="0"/>
+        </a:p>
+      </dgm:t>
+    </dgm:pt>
+    <dgm:pt modelId="{EC0171A9-E246-C346-92EB-57D6F181A705}" type="parTrans" cxnId="{9603CA5F-56EF-2D42-8EB5-C61A35816EAD}">
+      <dgm:prSet/>
+      <dgm:spPr/>
+      <dgm:t>
+        <a:bodyPr/>
+        <a:lstStyle/>
+        <a:p>
+          <a:endParaRPr lang="en-US"/>
+        </a:p>
+      </dgm:t>
+    </dgm:pt>
+    <dgm:pt modelId="{73E086BD-5331-BB4A-9071-89A13D52E231}" type="sibTrans" cxnId="{9603CA5F-56EF-2D42-8EB5-C61A35816EAD}">
+      <dgm:prSet/>
+      <dgm:spPr/>
+      <dgm:t>
+        <a:bodyPr/>
+        <a:lstStyle/>
+        <a:p>
+          <a:endParaRPr lang="en-US"/>
+        </a:p>
+      </dgm:t>
+    </dgm:pt>
+    <dgm:pt modelId="{946817CA-D053-494D-945B-0E88A9905E82}" type="pres">
+      <dgm:prSet presAssocID="{683371B2-C2AA-DB43-9854-31EEF0575116}" presName="composite" presStyleCnt="0">
+        <dgm:presLayoutVars>
+          <dgm:chMax val="1"/>
+          <dgm:dir/>
+          <dgm:resizeHandles val="exact"/>
+        </dgm:presLayoutVars>
+      </dgm:prSet>
+      <dgm:spPr/>
+    </dgm:pt>
+    <dgm:pt modelId="{D5611DBD-2075-2C4A-AF59-980277F32EBC}" type="pres">
+      <dgm:prSet presAssocID="{683371B2-C2AA-DB43-9854-31EEF0575116}" presName="radial" presStyleCnt="0">
+        <dgm:presLayoutVars>
+          <dgm:animLvl val="ctr"/>
+        </dgm:presLayoutVars>
+      </dgm:prSet>
+      <dgm:spPr/>
+    </dgm:pt>
+    <dgm:pt modelId="{0275D4D1-8BCC-5948-A52E-397BA9589974}" type="pres">
+      <dgm:prSet presAssocID="{69DD41FD-F34F-3E42-A2D4-4AE4517F389B}" presName="centerShape" presStyleLbl="vennNode1" presStyleIdx="0" presStyleCnt="7"/>
+      <dgm:spPr/>
+      <dgm:t>
+        <a:bodyPr/>
+        <a:lstStyle/>
+        <a:p>
+          <a:endParaRPr lang="en-US"/>
+        </a:p>
+      </dgm:t>
+    </dgm:pt>
+    <dgm:pt modelId="{E13DB76A-9083-2844-AF42-301D66245C04}" type="pres">
+      <dgm:prSet presAssocID="{0430650A-DEE1-7049-BE2B-D51C6D6EF916}" presName="node" presStyleLbl="vennNode1" presStyleIdx="1" presStyleCnt="7">
+        <dgm:presLayoutVars>
+          <dgm:bulletEnabled val="1"/>
+        </dgm:presLayoutVars>
+      </dgm:prSet>
+      <dgm:spPr/>
+      <dgm:t>
+        <a:bodyPr/>
+        <a:lstStyle/>
+        <a:p>
+          <a:endParaRPr lang="en-US"/>
+        </a:p>
+      </dgm:t>
+    </dgm:pt>
+    <dgm:pt modelId="{872D54DD-5FBD-8B4F-A5E3-8EC5DF269E42}" type="pres">
+      <dgm:prSet presAssocID="{0816358B-4D3A-2F44-B5C3-D19D4A4D34C2}" presName="node" presStyleLbl="vennNode1" presStyleIdx="2" presStyleCnt="7">
+        <dgm:presLayoutVars>
+          <dgm:bulletEnabled val="1"/>
+        </dgm:presLayoutVars>
+      </dgm:prSet>
+      <dgm:spPr/>
+    </dgm:pt>
+    <dgm:pt modelId="{7462725D-7BA3-B743-8681-5B33D90F2247}" type="pres">
+      <dgm:prSet presAssocID="{4E002EB9-9A73-DD43-94E1-C49964D9F166}" presName="node" presStyleLbl="vennNode1" presStyleIdx="3" presStyleCnt="7">
+        <dgm:presLayoutVars>
+          <dgm:bulletEnabled val="1"/>
+        </dgm:presLayoutVars>
+      </dgm:prSet>
+      <dgm:spPr/>
+    </dgm:pt>
+    <dgm:pt modelId="{5CFFADEF-F903-C74A-82BA-08F575C706FD}" type="pres">
+      <dgm:prSet presAssocID="{A9FF6EFD-54BD-1B42-9896-63D2CC49629E}" presName="node" presStyleLbl="vennNode1" presStyleIdx="4" presStyleCnt="7">
+        <dgm:presLayoutVars>
+          <dgm:bulletEnabled val="1"/>
+        </dgm:presLayoutVars>
+      </dgm:prSet>
+      <dgm:spPr/>
+      <dgm:t>
+        <a:bodyPr/>
+        <a:lstStyle/>
+        <a:p>
+          <a:endParaRPr lang="en-US"/>
+        </a:p>
+      </dgm:t>
+    </dgm:pt>
+    <dgm:pt modelId="{75E145FF-5BD4-F04B-84D7-E2D8629C2845}" type="pres">
+      <dgm:prSet presAssocID="{9179CDE9-7537-0C48-8BB9-87173F9F69A7}" presName="node" presStyleLbl="vennNode1" presStyleIdx="5" presStyleCnt="7">
+        <dgm:presLayoutVars>
+          <dgm:bulletEnabled val="1"/>
+        </dgm:presLayoutVars>
+      </dgm:prSet>
+      <dgm:spPr/>
+    </dgm:pt>
+    <dgm:pt modelId="{A550E983-490C-EF4C-86C4-10D9ADA83629}" type="pres">
+      <dgm:prSet presAssocID="{B8ED3405-4AD3-9942-9811-C9289EC33BBD}" presName="node" presStyleLbl="vennNode1" presStyleIdx="6" presStyleCnt="7">
+        <dgm:presLayoutVars>
+          <dgm:bulletEnabled val="1"/>
+        </dgm:presLayoutVars>
+      </dgm:prSet>
+      <dgm:spPr/>
+    </dgm:pt>
+  </dgm:ptLst>
+  <dgm:cxnLst>
+    <dgm:cxn modelId="{0B4B52CC-5C8B-074C-B83C-3A2BB46DB1FA}" srcId="{69DD41FD-F34F-3E42-A2D4-4AE4517F389B}" destId="{0430650A-DEE1-7049-BE2B-D51C6D6EF916}" srcOrd="0" destOrd="0" parTransId="{AB5AF7CA-0473-F440-AB97-381CDBAA68F9}" sibTransId="{1F37CFCB-F0E1-EF4A-9DAB-2C1F59A64ECB}"/>
+    <dgm:cxn modelId="{047CEA20-1AA0-7E4A-ACE5-006D37D1F7EC}" type="presOf" srcId="{A9FF6EFD-54BD-1B42-9896-63D2CC49629E}" destId="{5CFFADEF-F903-C74A-82BA-08F575C706FD}" srcOrd="0" destOrd="0" presId="urn:microsoft.com/office/officeart/2005/8/layout/radial3"/>
+    <dgm:cxn modelId="{02A96B2E-B7CA-D549-94C9-3914ED8B19E5}" type="presOf" srcId="{0816358B-4D3A-2F44-B5C3-D19D4A4D34C2}" destId="{872D54DD-5FBD-8B4F-A5E3-8EC5DF269E42}" srcOrd="0" destOrd="0" presId="urn:microsoft.com/office/officeart/2005/8/layout/radial3"/>
+    <dgm:cxn modelId="{EAFA9578-F63A-D140-8B8E-4E0ED5E152CF}" type="presOf" srcId="{4E002EB9-9A73-DD43-94E1-C49964D9F166}" destId="{7462725D-7BA3-B743-8681-5B33D90F2247}" srcOrd="0" destOrd="0" presId="urn:microsoft.com/office/officeart/2005/8/layout/radial3"/>
+    <dgm:cxn modelId="{03D330E5-5CC6-FA49-9B9A-D2F9D207D1E4}" srcId="{683371B2-C2AA-DB43-9854-31EEF0575116}" destId="{69DD41FD-F34F-3E42-A2D4-4AE4517F389B}" srcOrd="0" destOrd="0" parTransId="{4E5F3E44-5970-A94A-A35E-096869EAD1EA}" sibTransId="{3A9439D1-1AB3-3F45-8542-92F3027CCCA7}"/>
+    <dgm:cxn modelId="{9603CA5F-56EF-2D42-8EB5-C61A35816EAD}" srcId="{69DD41FD-F34F-3E42-A2D4-4AE4517F389B}" destId="{B8ED3405-4AD3-9942-9811-C9289EC33BBD}" srcOrd="5" destOrd="0" parTransId="{EC0171A9-E246-C346-92EB-57D6F181A705}" sibTransId="{73E086BD-5331-BB4A-9071-89A13D52E231}"/>
+    <dgm:cxn modelId="{7A1A28CA-5102-144D-A5E3-841D3AD30C31}" srcId="{69DD41FD-F34F-3E42-A2D4-4AE4517F389B}" destId="{A9FF6EFD-54BD-1B42-9896-63D2CC49629E}" srcOrd="3" destOrd="0" parTransId="{9F7C346E-70AA-3442-813D-970D6EF4B0AC}" sibTransId="{B069F184-77FD-F643-A1ED-F5E39034AFB6}"/>
+    <dgm:cxn modelId="{47C8D877-F646-C74C-B7D5-00283B2C4D36}" type="presOf" srcId="{69DD41FD-F34F-3E42-A2D4-4AE4517F389B}" destId="{0275D4D1-8BCC-5948-A52E-397BA9589974}" srcOrd="0" destOrd="0" presId="urn:microsoft.com/office/officeart/2005/8/layout/radial3"/>
+    <dgm:cxn modelId="{F8CFC8A3-7428-C249-91F8-9A4873954A65}" srcId="{69DD41FD-F34F-3E42-A2D4-4AE4517F389B}" destId="{4E002EB9-9A73-DD43-94E1-C49964D9F166}" srcOrd="2" destOrd="0" parTransId="{90DD2ADA-48DF-D040-BF95-D638D4E2BA24}" sibTransId="{C955496F-2F19-C24C-AB66-2D17AB54D618}"/>
+    <dgm:cxn modelId="{E2C9DC83-800A-1543-8110-CA729736C58E}" srcId="{69DD41FD-F34F-3E42-A2D4-4AE4517F389B}" destId="{9179CDE9-7537-0C48-8BB9-87173F9F69A7}" srcOrd="4" destOrd="0" parTransId="{E1BB4AC7-11C1-B44E-9F5D-2BA24DE341AB}" sibTransId="{A66C6D08-B66A-7F49-A5DF-3910A6434674}"/>
+    <dgm:cxn modelId="{8AFCBA9A-7D62-AF4D-ADF6-19EBD13533C1}" type="presOf" srcId="{B8ED3405-4AD3-9942-9811-C9289EC33BBD}" destId="{A550E983-490C-EF4C-86C4-10D9ADA83629}" srcOrd="0" destOrd="0" presId="urn:microsoft.com/office/officeart/2005/8/layout/radial3"/>
+    <dgm:cxn modelId="{4519B43B-EF05-EB49-9E7B-73B944F5379B}" type="presOf" srcId="{0430650A-DEE1-7049-BE2B-D51C6D6EF916}" destId="{E13DB76A-9083-2844-AF42-301D66245C04}" srcOrd="0" destOrd="0" presId="urn:microsoft.com/office/officeart/2005/8/layout/radial3"/>
+    <dgm:cxn modelId="{1071E3EB-0C60-7B4E-A029-A641208D48C8}" type="presOf" srcId="{9179CDE9-7537-0C48-8BB9-87173F9F69A7}" destId="{75E145FF-5BD4-F04B-84D7-E2D8629C2845}" srcOrd="0" destOrd="0" presId="urn:microsoft.com/office/officeart/2005/8/layout/radial3"/>
+    <dgm:cxn modelId="{AE4ABE54-1877-A24C-9B0F-95EAB5A353A0}" type="presOf" srcId="{683371B2-C2AA-DB43-9854-31EEF0575116}" destId="{946817CA-D053-494D-945B-0E88A9905E82}" srcOrd="0" destOrd="0" presId="urn:microsoft.com/office/officeart/2005/8/layout/radial3"/>
+    <dgm:cxn modelId="{50788EAB-D68B-2E4E-B8EC-7285BEE85859}" srcId="{69DD41FD-F34F-3E42-A2D4-4AE4517F389B}" destId="{0816358B-4D3A-2F44-B5C3-D19D4A4D34C2}" srcOrd="1" destOrd="0" parTransId="{60727A49-B3F4-3742-8EC9-45F4B43DA2FA}" sibTransId="{74F2DDDB-D42E-6247-B3A6-6E6F3002A377}"/>
+    <dgm:cxn modelId="{D6344295-0F98-8B4C-8FCE-0650FDE3EB09}" type="presParOf" srcId="{946817CA-D053-494D-945B-0E88A9905E82}" destId="{D5611DBD-2075-2C4A-AF59-980277F32EBC}" srcOrd="0" destOrd="0" presId="urn:microsoft.com/office/officeart/2005/8/layout/radial3"/>
+    <dgm:cxn modelId="{CA7D49C9-7971-894F-A9D6-B285BC69BF29}" type="presParOf" srcId="{D5611DBD-2075-2C4A-AF59-980277F32EBC}" destId="{0275D4D1-8BCC-5948-A52E-397BA9589974}" srcOrd="0" destOrd="0" presId="urn:microsoft.com/office/officeart/2005/8/layout/radial3"/>
+    <dgm:cxn modelId="{30E418C0-450A-C242-B357-E80140AF39B3}" type="presParOf" srcId="{D5611DBD-2075-2C4A-AF59-980277F32EBC}" destId="{E13DB76A-9083-2844-AF42-301D66245C04}" srcOrd="1" destOrd="0" presId="urn:microsoft.com/office/officeart/2005/8/layout/radial3"/>
+    <dgm:cxn modelId="{633B42E3-8BB7-8F40-91A9-842761C9FF41}" type="presParOf" srcId="{D5611DBD-2075-2C4A-AF59-980277F32EBC}" destId="{872D54DD-5FBD-8B4F-A5E3-8EC5DF269E42}" srcOrd="2" destOrd="0" presId="urn:microsoft.com/office/officeart/2005/8/layout/radial3"/>
+    <dgm:cxn modelId="{CED99BCC-226C-D947-8F0E-7936150BB9E6}" type="presParOf" srcId="{D5611DBD-2075-2C4A-AF59-980277F32EBC}" destId="{7462725D-7BA3-B743-8681-5B33D90F2247}" srcOrd="3" destOrd="0" presId="urn:microsoft.com/office/officeart/2005/8/layout/radial3"/>
+    <dgm:cxn modelId="{0901F59E-920A-7D4B-8EFE-F7E6BE2A568A}" type="presParOf" srcId="{D5611DBD-2075-2C4A-AF59-980277F32EBC}" destId="{5CFFADEF-F903-C74A-82BA-08F575C706FD}" srcOrd="4" destOrd="0" presId="urn:microsoft.com/office/officeart/2005/8/layout/radial3"/>
+    <dgm:cxn modelId="{B1B5C910-4BA6-6D46-B48E-84B8B963CEB5}" type="presParOf" srcId="{D5611DBD-2075-2C4A-AF59-980277F32EBC}" destId="{75E145FF-5BD4-F04B-84D7-E2D8629C2845}" srcOrd="5" destOrd="0" presId="urn:microsoft.com/office/officeart/2005/8/layout/radial3"/>
+    <dgm:cxn modelId="{80BE739B-2046-9E47-B551-A4483FD1A537}" type="presParOf" srcId="{D5611DBD-2075-2C4A-AF59-980277F32EBC}" destId="{A550E983-490C-EF4C-86C4-10D9ADA83629}" srcOrd="6" destOrd="0" presId="urn:microsoft.com/office/officeart/2005/8/layout/radial3"/>
+  </dgm:cxnLst>
+  <dgm:bg/>
+  <dgm:whole/>
+  <dgm:extLst>
+    <a:ext uri="http://schemas.microsoft.com/office/drawing/2008/diagram">
+      <dsp:dataModelExt xmlns:dsp="http://schemas.microsoft.com/office/drawing/2008/diagram" relId="rId6" minVer="http://schemas.openxmlformats.org/drawingml/2006/diagram"/>
+    </a:ext>
+  </dgm:extLst>
+</dgm:dataModel>
+</file>
+
+<file path=ppt/diagrams/drawing1.xml><?xml version="1.0" encoding="utf-8"?>
+<dsp:drawing xmlns:dgm="http://schemas.openxmlformats.org/drawingml/2006/diagram" xmlns:dsp="http://schemas.microsoft.com/office/drawing/2008/diagram" xmlns:a="http://schemas.openxmlformats.org/drawingml/2006/main">
+  <dsp:spTree>
+    <dsp:nvGrpSpPr>
+      <dsp:cNvPr id="0" name=""/>
+      <dsp:cNvGrpSpPr/>
+    </dsp:nvGrpSpPr>
+    <dsp:grpSpPr/>
+    <dsp:sp modelId="{0275D4D1-8BCC-5948-A52E-397BA9589974}">
+      <dsp:nvSpPr>
+        <dsp:cNvPr id="0" name=""/>
+        <dsp:cNvSpPr/>
+      </dsp:nvSpPr>
+      <dsp:spPr>
+        <a:xfrm>
+          <a:off x="2561166" y="1206500"/>
+          <a:ext cx="3005666" cy="3005666"/>
+        </a:xfrm>
+        <a:prstGeom prst="ellipse">
+          <a:avLst/>
+        </a:prstGeom>
+        <a:gradFill rotWithShape="0">
+          <a:gsLst>
+            <a:gs pos="0">
+              <a:schemeClr val="accent2">
+                <a:alpha val="50000"/>
+                <a:hueOff val="0"/>
+                <a:satOff val="0"/>
+                <a:lumOff val="0"/>
+                <a:alphaOff val="0"/>
+                <a:satMod val="103000"/>
+                <a:lumMod val="102000"/>
+                <a:tint val="94000"/>
+              </a:schemeClr>
+            </a:gs>
+            <a:gs pos="50000">
+              <a:schemeClr val="accent2">
+                <a:alpha val="50000"/>
+                <a:hueOff val="0"/>
+                <a:satOff val="0"/>
+                <a:lumOff val="0"/>
+                <a:alphaOff val="0"/>
+                <a:satMod val="110000"/>
+                <a:lumMod val="100000"/>
+                <a:shade val="100000"/>
+              </a:schemeClr>
+            </a:gs>
+            <a:gs pos="100000">
+              <a:schemeClr val="accent2">
+                <a:alpha val="50000"/>
+                <a:hueOff val="0"/>
+                <a:satOff val="0"/>
+                <a:lumOff val="0"/>
+                <a:alphaOff val="0"/>
+                <a:lumMod val="99000"/>
+                <a:satMod val="120000"/>
+                <a:shade val="78000"/>
+              </a:schemeClr>
+            </a:gs>
+          </a:gsLst>
+          <a:lin ang="5400000" scaled="0"/>
+        </a:gradFill>
+        <a:ln>
+          <a:noFill/>
+        </a:ln>
+        <a:effectLst/>
+      </dsp:spPr>
+      <dsp:style>
+        <a:lnRef idx="0">
+          <a:scrgbClr r="0" g="0" b="0"/>
+        </a:lnRef>
+        <a:fillRef idx="3">
+          <a:scrgbClr r="0" g="0" b="0"/>
+        </a:fillRef>
+        <a:effectRef idx="0">
+          <a:scrgbClr r="0" g="0" b="0"/>
+        </a:effectRef>
+        <a:fontRef idx="minor">
+          <a:schemeClr val="tx1"/>
+        </a:fontRef>
+      </dsp:style>
+      <dsp:txBody>
+        <a:bodyPr spcFirstLastPara="0" vert="horz" wrap="square" lIns="45720" tIns="45720" rIns="45720" bIns="45720" numCol="1" spcCol="1270" anchor="ctr" anchorCtr="0">
+          <a:noAutofit/>
+        </a:bodyPr>
+        <a:lstStyle/>
+        <a:p>
+          <a:pPr lvl="0" algn="ctr" defTabSz="1600200">
+            <a:lnSpc>
+              <a:spcPct val="90000"/>
+            </a:lnSpc>
+            <a:spcBef>
+              <a:spcPct val="0"/>
+            </a:spcBef>
+            <a:spcAft>
+              <a:spcPct val="35000"/>
+            </a:spcAft>
+          </a:pPr>
+          <a:r>
+            <a:rPr lang="en-US" sz="3600" kern="1200" dirty="0" smtClean="0"/>
+            <a:t>EC2 Container Services (ECS)</a:t>
+          </a:r>
+          <a:endParaRPr lang="en-US" sz="3600" kern="1200" dirty="0"/>
+        </a:p>
+      </dsp:txBody>
+      <dsp:txXfrm>
+        <a:off x="3001336" y="1646670"/>
+        <a:ext cx="2125326" cy="2125326"/>
+      </dsp:txXfrm>
+    </dsp:sp>
+    <dsp:sp modelId="{E13DB76A-9083-2844-AF42-301D66245C04}">
+      <dsp:nvSpPr>
+        <dsp:cNvPr id="0" name=""/>
+        <dsp:cNvSpPr/>
+      </dsp:nvSpPr>
+      <dsp:spPr>
+        <a:xfrm>
+          <a:off x="3312583" y="536"/>
+          <a:ext cx="1502833" cy="1502833"/>
+        </a:xfrm>
+        <a:prstGeom prst="ellipse">
+          <a:avLst/>
+        </a:prstGeom>
+        <a:gradFill rotWithShape="0">
+          <a:gsLst>
+            <a:gs pos="0">
+              <a:schemeClr val="accent3">
+                <a:alpha val="50000"/>
+                <a:hueOff val="0"/>
+                <a:satOff val="0"/>
+                <a:lumOff val="0"/>
+                <a:alphaOff val="0"/>
+                <a:satMod val="103000"/>
+                <a:lumMod val="102000"/>
+                <a:tint val="94000"/>
+              </a:schemeClr>
+            </a:gs>
+            <a:gs pos="50000">
+              <a:schemeClr val="accent3">
+                <a:alpha val="50000"/>
+                <a:hueOff val="0"/>
+                <a:satOff val="0"/>
+                <a:lumOff val="0"/>
+                <a:alphaOff val="0"/>
+                <a:satMod val="110000"/>
+                <a:lumMod val="100000"/>
+                <a:shade val="100000"/>
+              </a:schemeClr>
+            </a:gs>
+            <a:gs pos="100000">
+              <a:schemeClr val="accent3">
+                <a:alpha val="50000"/>
+                <a:hueOff val="0"/>
+                <a:satOff val="0"/>
+                <a:lumOff val="0"/>
+                <a:alphaOff val="0"/>
+                <a:lumMod val="99000"/>
+                <a:satMod val="120000"/>
+                <a:shade val="78000"/>
+              </a:schemeClr>
+            </a:gs>
+          </a:gsLst>
+          <a:lin ang="5400000" scaled="0"/>
+        </a:gradFill>
+        <a:ln>
+          <a:noFill/>
+        </a:ln>
+        <a:effectLst/>
+      </dsp:spPr>
+      <dsp:style>
+        <a:lnRef idx="0">
+          <a:scrgbClr r="0" g="0" b="0"/>
+        </a:lnRef>
+        <a:fillRef idx="3">
+          <a:scrgbClr r="0" g="0" b="0"/>
+        </a:fillRef>
+        <a:effectRef idx="0">
+          <a:scrgbClr r="0" g="0" b="0"/>
+        </a:effectRef>
+        <a:fontRef idx="minor">
+          <a:schemeClr val="tx1"/>
+        </a:fontRef>
+      </dsp:style>
+      <dsp:txBody>
+        <a:bodyPr spcFirstLastPara="0" vert="horz" wrap="square" lIns="22860" tIns="22860" rIns="22860" bIns="22860" numCol="1" spcCol="1270" anchor="ctr" anchorCtr="0">
+          <a:noAutofit/>
+        </a:bodyPr>
+        <a:lstStyle/>
+        <a:p>
+          <a:pPr lvl="0" algn="ctr" defTabSz="800100">
+            <a:lnSpc>
+              <a:spcPct val="90000"/>
+            </a:lnSpc>
+            <a:spcBef>
+              <a:spcPct val="0"/>
+            </a:spcBef>
+            <a:spcAft>
+              <a:spcPct val="35000"/>
+            </a:spcAft>
+          </a:pPr>
+          <a:r>
+            <a:rPr lang="en-US" sz="1800" kern="1200" dirty="0" smtClean="0"/>
+            <a:t>Cluster</a:t>
+          </a:r>
+          <a:endParaRPr lang="en-US" sz="1800" kern="1200" dirty="0"/>
+        </a:p>
+      </dsp:txBody>
+      <dsp:txXfrm>
+        <a:off x="3532668" y="220621"/>
+        <a:ext cx="1062663" cy="1062663"/>
+      </dsp:txXfrm>
+    </dsp:sp>
+    <dsp:sp modelId="{872D54DD-5FBD-8B4F-A5E3-8EC5DF269E42}">
+      <dsp:nvSpPr>
+        <dsp:cNvPr id="0" name=""/>
+        <dsp:cNvSpPr/>
+      </dsp:nvSpPr>
+      <dsp:spPr>
+        <a:xfrm>
+          <a:off x="5007724" y="979226"/>
+          <a:ext cx="1502833" cy="1502833"/>
+        </a:xfrm>
+        <a:prstGeom prst="ellipse">
+          <a:avLst/>
+        </a:prstGeom>
+        <a:gradFill rotWithShape="0">
+          <a:gsLst>
+            <a:gs pos="0">
+              <a:schemeClr val="accent4">
+                <a:alpha val="50000"/>
+                <a:hueOff val="0"/>
+                <a:satOff val="0"/>
+                <a:lumOff val="0"/>
+                <a:alphaOff val="0"/>
+                <a:satMod val="103000"/>
+                <a:lumMod val="102000"/>
+                <a:tint val="94000"/>
+              </a:schemeClr>
+            </a:gs>
+            <a:gs pos="50000">
+              <a:schemeClr val="accent4">
+                <a:alpha val="50000"/>
+                <a:hueOff val="0"/>
+                <a:satOff val="0"/>
+                <a:lumOff val="0"/>
+                <a:alphaOff val="0"/>
+                <a:satMod val="110000"/>
+                <a:lumMod val="100000"/>
+                <a:shade val="100000"/>
+              </a:schemeClr>
+            </a:gs>
+            <a:gs pos="100000">
+              <a:schemeClr val="accent4">
+                <a:alpha val="50000"/>
+                <a:hueOff val="0"/>
+                <a:satOff val="0"/>
+                <a:lumOff val="0"/>
+                <a:alphaOff val="0"/>
+                <a:lumMod val="99000"/>
+                <a:satMod val="120000"/>
+                <a:shade val="78000"/>
+              </a:schemeClr>
+            </a:gs>
+          </a:gsLst>
+          <a:lin ang="5400000" scaled="0"/>
+        </a:gradFill>
+        <a:ln>
+          <a:noFill/>
+        </a:ln>
+        <a:effectLst/>
+      </dsp:spPr>
+      <dsp:style>
+        <a:lnRef idx="0">
+          <a:scrgbClr r="0" g="0" b="0"/>
+        </a:lnRef>
+        <a:fillRef idx="3">
+          <a:scrgbClr r="0" g="0" b="0"/>
+        </a:fillRef>
+        <a:effectRef idx="0">
+          <a:scrgbClr r="0" g="0" b="0"/>
+        </a:effectRef>
+        <a:fontRef idx="minor">
+          <a:schemeClr val="tx1"/>
+        </a:fontRef>
+      </dsp:style>
+      <dsp:txBody>
+        <a:bodyPr spcFirstLastPara="0" vert="horz" wrap="square" lIns="22860" tIns="22860" rIns="22860" bIns="22860" numCol="1" spcCol="1270" anchor="ctr" anchorCtr="0">
+          <a:noAutofit/>
+        </a:bodyPr>
+        <a:lstStyle/>
+        <a:p>
+          <a:pPr lvl="0" algn="ctr" defTabSz="800100">
+            <a:lnSpc>
+              <a:spcPct val="90000"/>
+            </a:lnSpc>
+            <a:spcBef>
+              <a:spcPct val="0"/>
+            </a:spcBef>
+            <a:spcAft>
+              <a:spcPct val="35000"/>
+            </a:spcAft>
+          </a:pPr>
+          <a:r>
+            <a:rPr lang="en-US" sz="1800" kern="1200" dirty="0" smtClean="0"/>
+            <a:t>Container Instance</a:t>
+          </a:r>
+          <a:endParaRPr lang="en-US" sz="1800" kern="1200" dirty="0"/>
+        </a:p>
+      </dsp:txBody>
+      <dsp:txXfrm>
+        <a:off x="5227809" y="1199311"/>
+        <a:ext cx="1062663" cy="1062663"/>
+      </dsp:txXfrm>
+    </dsp:sp>
+    <dsp:sp modelId="{7462725D-7BA3-B743-8681-5B33D90F2247}">
+      <dsp:nvSpPr>
+        <dsp:cNvPr id="0" name=""/>
+        <dsp:cNvSpPr/>
+      </dsp:nvSpPr>
+      <dsp:spPr>
+        <a:xfrm>
+          <a:off x="5007724" y="2936606"/>
+          <a:ext cx="1502833" cy="1502833"/>
+        </a:xfrm>
+        <a:prstGeom prst="ellipse">
+          <a:avLst/>
+        </a:prstGeom>
+        <a:gradFill rotWithShape="0">
+          <a:gsLst>
+            <a:gs pos="0">
+              <a:schemeClr val="accent5">
+                <a:alpha val="50000"/>
+                <a:hueOff val="0"/>
+                <a:satOff val="0"/>
+                <a:lumOff val="0"/>
+                <a:alphaOff val="0"/>
+                <a:satMod val="103000"/>
+                <a:lumMod val="102000"/>
+                <a:tint val="94000"/>
+              </a:schemeClr>
+            </a:gs>
+            <a:gs pos="50000">
+              <a:schemeClr val="accent5">
+                <a:alpha val="50000"/>
+                <a:hueOff val="0"/>
+                <a:satOff val="0"/>
+                <a:lumOff val="0"/>
+                <a:alphaOff val="0"/>
+                <a:satMod val="110000"/>
+                <a:lumMod val="100000"/>
+                <a:shade val="100000"/>
+              </a:schemeClr>
+            </a:gs>
+            <a:gs pos="100000">
+              <a:schemeClr val="accent5">
+                <a:alpha val="50000"/>
+                <a:hueOff val="0"/>
+                <a:satOff val="0"/>
+                <a:lumOff val="0"/>
+                <a:alphaOff val="0"/>
+                <a:lumMod val="99000"/>
+                <a:satMod val="120000"/>
+                <a:shade val="78000"/>
+              </a:schemeClr>
+            </a:gs>
+          </a:gsLst>
+          <a:lin ang="5400000" scaled="0"/>
+        </a:gradFill>
+        <a:ln>
+          <a:noFill/>
+        </a:ln>
+        <a:effectLst/>
+      </dsp:spPr>
+      <dsp:style>
+        <a:lnRef idx="0">
+          <a:scrgbClr r="0" g="0" b="0"/>
+        </a:lnRef>
+        <a:fillRef idx="3">
+          <a:scrgbClr r="0" g="0" b="0"/>
+        </a:fillRef>
+        <a:effectRef idx="0">
+          <a:scrgbClr r="0" g="0" b="0"/>
+        </a:effectRef>
+        <a:fontRef idx="minor">
+          <a:schemeClr val="tx1"/>
+        </a:fontRef>
+      </dsp:style>
+      <dsp:txBody>
+        <a:bodyPr spcFirstLastPara="0" vert="horz" wrap="square" lIns="22860" tIns="22860" rIns="22860" bIns="22860" numCol="1" spcCol="1270" anchor="ctr" anchorCtr="0">
+          <a:noAutofit/>
+        </a:bodyPr>
+        <a:lstStyle/>
+        <a:p>
+          <a:pPr lvl="0" algn="ctr" defTabSz="800100">
+            <a:lnSpc>
+              <a:spcPct val="90000"/>
+            </a:lnSpc>
+            <a:spcBef>
+              <a:spcPct val="0"/>
+            </a:spcBef>
+            <a:spcAft>
+              <a:spcPct val="35000"/>
+            </a:spcAft>
+          </a:pPr>
+          <a:r>
+            <a:rPr lang="en-US" sz="1800" kern="1200" dirty="0" smtClean="0"/>
+            <a:t>Task Definition</a:t>
+          </a:r>
+          <a:endParaRPr lang="en-US" sz="1800" kern="1200" dirty="0"/>
+        </a:p>
+      </dsp:txBody>
+      <dsp:txXfrm>
+        <a:off x="5227809" y="3156691"/>
+        <a:ext cx="1062663" cy="1062663"/>
+      </dsp:txXfrm>
+    </dsp:sp>
+    <dsp:sp modelId="{5CFFADEF-F903-C74A-82BA-08F575C706FD}">
+      <dsp:nvSpPr>
+        <dsp:cNvPr id="0" name=""/>
+        <dsp:cNvSpPr/>
+      </dsp:nvSpPr>
+      <dsp:spPr>
+        <a:xfrm>
+          <a:off x="3312583" y="3915297"/>
+          <a:ext cx="1502833" cy="1502833"/>
+        </a:xfrm>
+        <a:prstGeom prst="ellipse">
+          <a:avLst/>
+        </a:prstGeom>
+        <a:gradFill rotWithShape="0">
+          <a:gsLst>
+            <a:gs pos="0">
+              <a:schemeClr val="accent6">
+                <a:alpha val="50000"/>
+                <a:hueOff val="0"/>
+                <a:satOff val="0"/>
+                <a:lumOff val="0"/>
+                <a:alphaOff val="0"/>
+                <a:satMod val="103000"/>
+                <a:lumMod val="102000"/>
+                <a:tint val="94000"/>
+              </a:schemeClr>
+            </a:gs>
+            <a:gs pos="50000">
+              <a:schemeClr val="accent6">
+                <a:alpha val="50000"/>
+                <a:hueOff val="0"/>
+                <a:satOff val="0"/>
+                <a:lumOff val="0"/>
+                <a:alphaOff val="0"/>
+                <a:satMod val="110000"/>
+                <a:lumMod val="100000"/>
+                <a:shade val="100000"/>
+              </a:schemeClr>
+            </a:gs>
+            <a:gs pos="100000">
+              <a:schemeClr val="accent6">
+                <a:alpha val="50000"/>
+                <a:hueOff val="0"/>
+                <a:satOff val="0"/>
+                <a:lumOff val="0"/>
+                <a:alphaOff val="0"/>
+                <a:lumMod val="99000"/>
+                <a:satMod val="120000"/>
+                <a:shade val="78000"/>
+              </a:schemeClr>
+            </a:gs>
+          </a:gsLst>
+          <a:lin ang="5400000" scaled="0"/>
+        </a:gradFill>
+        <a:ln>
+          <a:noFill/>
+        </a:ln>
+        <a:effectLst/>
+      </dsp:spPr>
+      <dsp:style>
+        <a:lnRef idx="0">
+          <a:scrgbClr r="0" g="0" b="0"/>
+        </a:lnRef>
+        <a:fillRef idx="3">
+          <a:scrgbClr r="0" g="0" b="0"/>
+        </a:fillRef>
+        <a:effectRef idx="0">
+          <a:scrgbClr r="0" g="0" b="0"/>
+        </a:effectRef>
+        <a:fontRef idx="minor">
+          <a:schemeClr val="tx1"/>
+        </a:fontRef>
+      </dsp:style>
+      <dsp:txBody>
+        <a:bodyPr spcFirstLastPara="0" vert="horz" wrap="square" lIns="22860" tIns="22860" rIns="22860" bIns="22860" numCol="1" spcCol="1270" anchor="ctr" anchorCtr="0">
+          <a:noAutofit/>
+        </a:bodyPr>
+        <a:lstStyle/>
+        <a:p>
+          <a:pPr lvl="0" algn="ctr" defTabSz="800100">
+            <a:lnSpc>
+              <a:spcPct val="90000"/>
+            </a:lnSpc>
+            <a:spcBef>
+              <a:spcPct val="0"/>
+            </a:spcBef>
+            <a:spcAft>
+              <a:spcPct val="35000"/>
+            </a:spcAft>
+          </a:pPr>
+          <a:r>
+            <a:rPr lang="en-US" sz="1800" kern="1200" dirty="0" smtClean="0"/>
+            <a:t>Task</a:t>
+          </a:r>
+          <a:endParaRPr lang="en-US" sz="1800" kern="1200" dirty="0"/>
+        </a:p>
+      </dsp:txBody>
+      <dsp:txXfrm>
+        <a:off x="3532668" y="4135382"/>
+        <a:ext cx="1062663" cy="1062663"/>
+      </dsp:txXfrm>
+    </dsp:sp>
+    <dsp:sp modelId="{75E145FF-5BD4-F04B-84D7-E2D8629C2845}">
+      <dsp:nvSpPr>
+        <dsp:cNvPr id="0" name=""/>
+        <dsp:cNvSpPr/>
+      </dsp:nvSpPr>
+      <dsp:spPr>
+        <a:xfrm>
+          <a:off x="1617442" y="2936606"/>
+          <a:ext cx="1502833" cy="1502833"/>
+        </a:xfrm>
+        <a:prstGeom prst="ellipse">
+          <a:avLst/>
+        </a:prstGeom>
+        <a:gradFill rotWithShape="0">
+          <a:gsLst>
+            <a:gs pos="0">
+              <a:schemeClr val="accent2">
+                <a:alpha val="50000"/>
+                <a:hueOff val="0"/>
+                <a:satOff val="0"/>
+                <a:lumOff val="0"/>
+                <a:alphaOff val="0"/>
+                <a:satMod val="103000"/>
+                <a:lumMod val="102000"/>
+                <a:tint val="94000"/>
+              </a:schemeClr>
+            </a:gs>
+            <a:gs pos="50000">
+              <a:schemeClr val="accent2">
+                <a:alpha val="50000"/>
+                <a:hueOff val="0"/>
+                <a:satOff val="0"/>
+                <a:lumOff val="0"/>
+                <a:alphaOff val="0"/>
+                <a:satMod val="110000"/>
+                <a:lumMod val="100000"/>
+                <a:shade val="100000"/>
+              </a:schemeClr>
+            </a:gs>
+            <a:gs pos="100000">
+              <a:schemeClr val="accent2">
+                <a:alpha val="50000"/>
+                <a:hueOff val="0"/>
+                <a:satOff val="0"/>
+                <a:lumOff val="0"/>
+                <a:alphaOff val="0"/>
+                <a:lumMod val="99000"/>
+                <a:satMod val="120000"/>
+                <a:shade val="78000"/>
+              </a:schemeClr>
+            </a:gs>
+          </a:gsLst>
+          <a:lin ang="5400000" scaled="0"/>
+        </a:gradFill>
+        <a:ln>
+          <a:noFill/>
+        </a:ln>
+        <a:effectLst/>
+      </dsp:spPr>
+      <dsp:style>
+        <a:lnRef idx="0">
+          <a:scrgbClr r="0" g="0" b="0"/>
+        </a:lnRef>
+        <a:fillRef idx="3">
+          <a:scrgbClr r="0" g="0" b="0"/>
+        </a:fillRef>
+        <a:effectRef idx="0">
+          <a:scrgbClr r="0" g="0" b="0"/>
+        </a:effectRef>
+        <a:fontRef idx="minor">
+          <a:schemeClr val="tx1"/>
+        </a:fontRef>
+      </dsp:style>
+      <dsp:txBody>
+        <a:bodyPr spcFirstLastPara="0" vert="horz" wrap="square" lIns="22860" tIns="22860" rIns="22860" bIns="22860" numCol="1" spcCol="1270" anchor="ctr" anchorCtr="0">
+          <a:noAutofit/>
+        </a:bodyPr>
+        <a:lstStyle/>
+        <a:p>
+          <a:pPr lvl="0" algn="ctr" defTabSz="800100">
+            <a:lnSpc>
+              <a:spcPct val="90000"/>
+            </a:lnSpc>
+            <a:spcBef>
+              <a:spcPct val="0"/>
+            </a:spcBef>
+            <a:spcAft>
+              <a:spcPct val="35000"/>
+            </a:spcAft>
+          </a:pPr>
+          <a:r>
+            <a:rPr lang="en-US" sz="1800" kern="1200" dirty="0" smtClean="0"/>
+            <a:t>Service</a:t>
+          </a:r>
+          <a:endParaRPr lang="en-US" sz="1800" kern="1200" dirty="0"/>
+        </a:p>
+      </dsp:txBody>
+      <dsp:txXfrm>
+        <a:off x="1837527" y="3156691"/>
+        <a:ext cx="1062663" cy="1062663"/>
+      </dsp:txXfrm>
+    </dsp:sp>
+    <dsp:sp modelId="{A550E983-490C-EF4C-86C4-10D9ADA83629}">
+      <dsp:nvSpPr>
+        <dsp:cNvPr id="0" name=""/>
+        <dsp:cNvSpPr/>
+      </dsp:nvSpPr>
+      <dsp:spPr>
+        <a:xfrm>
+          <a:off x="1617442" y="979226"/>
+          <a:ext cx="1502833" cy="1502833"/>
+        </a:xfrm>
+        <a:prstGeom prst="ellipse">
+          <a:avLst/>
+        </a:prstGeom>
+        <a:gradFill rotWithShape="0">
+          <a:gsLst>
+            <a:gs pos="0">
+              <a:schemeClr val="accent3">
+                <a:alpha val="50000"/>
+                <a:hueOff val="0"/>
+                <a:satOff val="0"/>
+                <a:lumOff val="0"/>
+                <a:alphaOff val="0"/>
+                <a:satMod val="103000"/>
+                <a:lumMod val="102000"/>
+                <a:tint val="94000"/>
+              </a:schemeClr>
+            </a:gs>
+            <a:gs pos="50000">
+              <a:schemeClr val="accent3">
+                <a:alpha val="50000"/>
+                <a:hueOff val="0"/>
+                <a:satOff val="0"/>
+                <a:lumOff val="0"/>
+                <a:alphaOff val="0"/>
+                <a:satMod val="110000"/>
+                <a:lumMod val="100000"/>
+                <a:shade val="100000"/>
+              </a:schemeClr>
+            </a:gs>
+            <a:gs pos="100000">
+              <a:schemeClr val="accent3">
+                <a:alpha val="50000"/>
+                <a:hueOff val="0"/>
+                <a:satOff val="0"/>
+                <a:lumOff val="0"/>
+                <a:alphaOff val="0"/>
+                <a:lumMod val="99000"/>
+                <a:satMod val="120000"/>
+                <a:shade val="78000"/>
+              </a:schemeClr>
+            </a:gs>
+          </a:gsLst>
+          <a:lin ang="5400000" scaled="0"/>
+        </a:gradFill>
+        <a:ln>
+          <a:noFill/>
+        </a:ln>
+        <a:effectLst/>
+      </dsp:spPr>
+      <dsp:style>
+        <a:lnRef idx="0">
+          <a:scrgbClr r="0" g="0" b="0"/>
+        </a:lnRef>
+        <a:fillRef idx="3">
+          <a:scrgbClr r="0" g="0" b="0"/>
+        </a:fillRef>
+        <a:effectRef idx="0">
+          <a:scrgbClr r="0" g="0" b="0"/>
+        </a:effectRef>
+        <a:fontRef idx="minor">
+          <a:schemeClr val="tx1"/>
+        </a:fontRef>
+      </dsp:style>
+      <dsp:txBody>
+        <a:bodyPr spcFirstLastPara="0" vert="horz" wrap="square" lIns="22860" tIns="22860" rIns="22860" bIns="22860" numCol="1" spcCol="1270" anchor="ctr" anchorCtr="0">
+          <a:noAutofit/>
+        </a:bodyPr>
+        <a:lstStyle/>
+        <a:p>
+          <a:pPr lvl="0" algn="ctr" defTabSz="800100">
+            <a:lnSpc>
+              <a:spcPct val="90000"/>
+            </a:lnSpc>
+            <a:spcBef>
+              <a:spcPct val="0"/>
+            </a:spcBef>
+            <a:spcAft>
+              <a:spcPct val="35000"/>
+            </a:spcAft>
+          </a:pPr>
+          <a:r>
+            <a:rPr lang="en-US" sz="1800" kern="1200" smtClean="0"/>
+            <a:t>Repository</a:t>
+          </a:r>
+          <a:endParaRPr lang="en-US" sz="1800" kern="1200" dirty="0"/>
+        </a:p>
+      </dsp:txBody>
+      <dsp:txXfrm>
+        <a:off x="1837527" y="1199311"/>
+        <a:ext cx="1062663" cy="1062663"/>
+      </dsp:txXfrm>
+    </dsp:sp>
+  </dsp:spTree>
+</dsp:drawing>
+</file>
+
+<file path=ppt/diagrams/layout1.xml><?xml version="1.0" encoding="utf-8"?>
+<dgm:layoutDef xmlns:dgm="http://schemas.openxmlformats.org/drawingml/2006/diagram" xmlns:a="http://schemas.openxmlformats.org/drawingml/2006/main" uniqueId="urn:microsoft.com/office/officeart/2005/8/layout/radial3">
+  <dgm:title val=""/>
+  <dgm:desc val=""/>
+  <dgm:catLst>
+    <dgm:cat type="relationship" pri="31000"/>
+    <dgm:cat type="cycle" pri="12000"/>
+  </dgm:catLst>
+  <dgm:sampData>
+    <dgm:dataModel>
+      <dgm:ptLst>
+        <dgm:pt modelId="0" type="doc"/>
+        <dgm:pt modelId="1">
+          <dgm:prSet phldr="1"/>
+        </dgm:pt>
+        <dgm:pt modelId="11">
+          <dgm:prSet phldr="1"/>
+        </dgm:pt>
+        <dgm:pt modelId="12">
+          <dgm:prSet phldr="1"/>
+        </dgm:pt>
+        <dgm:pt modelId="13">
+          <dgm:prSet phldr="1"/>
+        </dgm:pt>
+        <dgm:pt modelId="14">
+          <dgm:prSet phldr="1"/>
+        </dgm:pt>
+      </dgm:ptLst>
+      <dgm:cxnLst>
+        <dgm:cxn modelId="2" srcId="0" destId="1" srcOrd="0" destOrd="0"/>
+        <dgm:cxn modelId="3" srcId="1" destId="11" srcOrd="0" destOrd="0"/>
+        <dgm:cxn modelId="4" srcId="1" destId="12" srcOrd="1" destOrd="0"/>
+        <dgm:cxn modelId="5" srcId="1" destId="13" srcOrd="2" destOrd="0"/>
+        <dgm:cxn modelId="6" srcId="1" destId="14" srcOrd="3" destOrd="0"/>
+      </dgm:cxnLst>
+      <dgm:bg/>
+      <dgm:whole/>
+    </dgm:dataModel>
+  </dgm:sampData>
+  <dgm:styleData>
+    <dgm:dataModel>
+      <dgm:ptLst>
+        <dgm:pt modelId="0" type="doc"/>
+        <dgm:pt modelId="1"/>
+        <dgm:pt modelId="11"/>
+        <dgm:pt modelId="12"/>
+        <dgm:pt modelId="13"/>
+      </dgm:ptLst>
+      <dgm:cxnLst>
+        <dgm:cxn modelId="2" srcId="0" destId="1" srcOrd="0" destOrd="0"/>
+        <dgm:cxn modelId="15" srcId="1" destId="11" srcOrd="0" destOrd="0"/>
+        <dgm:cxn modelId="16" srcId="1" destId="12" srcOrd="1" destOrd="0"/>
+        <dgm:cxn modelId="17" srcId="1" destId="13" srcOrd="2" destOrd="0"/>
+      </dgm:cxnLst>
+      <dgm:bg/>
+      <dgm:whole/>
+    </dgm:dataModel>
+  </dgm:styleData>
+  <dgm:clrData>
+    <dgm:dataModel>
+      <dgm:ptLst>
+        <dgm:pt modelId="0" type="doc"/>
+        <dgm:pt modelId="1"/>
+        <dgm:pt modelId="11"/>
+        <dgm:pt modelId="12"/>
+        <dgm:pt modelId="13"/>
+        <dgm:pt modelId="14"/>
+        <dgm:pt modelId="15"/>
+        <dgm:pt modelId="16"/>
+      </dgm:ptLst>
+      <dgm:cxnLst>
+        <dgm:cxn modelId="2" srcId="0" destId="1" srcOrd="0" destOrd="0"/>
+        <dgm:cxn modelId="16" srcId="1" destId="11" srcOrd="0" destOrd="0"/>
+        <dgm:cxn modelId="17" srcId="1" destId="12" srcOrd="1" destOrd="0"/>
+        <dgm:cxn modelId="18" srcId="1" destId="13" srcOrd="2" destOrd="0"/>
+        <dgm:cxn modelId="19" srcId="1" destId="14" srcOrd="3" destOrd="0"/>
+        <dgm:cxn modelId="20" srcId="1" destId="15" srcOrd="4" destOrd="0"/>
+        <dgm:cxn modelId="21" srcId="1" destId="16" srcOrd="5" destOrd="0"/>
+      </dgm:cxnLst>
+      <dgm:bg/>
+      <dgm:whole/>
+    </dgm:dataModel>
+  </dgm:clrData>
+  <dgm:layoutNode name="composite">
+    <dgm:varLst>
+      <dgm:chMax val="1"/>
+      <dgm:dir/>
+      <dgm:resizeHandles val="exact"/>
+    </dgm:varLst>
+    <dgm:alg type="composite">
+      <dgm:param type="ar" val="1"/>
+    </dgm:alg>
+    <dgm:shape xmlns:r="http://schemas.openxmlformats.org/officeDocument/2006/relationships" r:blip="">
+      <dgm:adjLst/>
+    </dgm:shape>
+    <dgm:presOf/>
+    <dgm:constrLst/>
+    <dgm:ruleLst/>
+    <dgm:layoutNode name="radial">
+      <dgm:varLst>
+        <dgm:animLvl val="ctr"/>
+      </dgm:varLst>
+      <dgm:choose name="Name0">
+        <dgm:if name="Name1" func="var" arg="dir" op="equ" val="norm">
+          <dgm:choose name="Name2">
+            <dgm:if name="Name3" axis="ch ch" ptType="node node" st="1 1" cnt="1 0" func="cnt" op="lte" val="1">
+              <dgm:alg type="cycle">
+                <dgm:param type="stAng" val="90"/>
+                <dgm:param type="spanAng" val="360"/>
+                <dgm:param type="ctrShpMap" val="fNode"/>
+              </dgm:alg>
+            </dgm:if>
+            <dgm:else name="Name4">
+              <dgm:alg type="cycle">
+                <dgm:param type="stAng" val="0"/>
+                <dgm:param type="spanAng" val="360"/>
+                <dgm:param type="ctrShpMap" val="fNode"/>
+              </dgm:alg>
+            </dgm:else>
+          </dgm:choose>
+        </dgm:if>
+        <dgm:else name="Name5">
+          <dgm:alg type="cycle">
+            <dgm:param type="stAng" val="0"/>
+            <dgm:param type="spanAng" val="-360"/>
+            <dgm:param type="ctrShpMap" val="fNode"/>
+          </dgm:alg>
+        </dgm:else>
+      </dgm:choose>
+      <dgm:shape xmlns:r="http://schemas.openxmlformats.org/officeDocument/2006/relationships" r:blip="">
+        <dgm:adjLst/>
+      </dgm:shape>
+      <dgm:presOf/>
+      <dgm:constrLst>
+        <dgm:constr type="w" for="ch" forName="centerShape" refType="w"/>
+        <dgm:constr type="h" for="ch" forName="centerShape" refType="h"/>
+        <dgm:constr type="w" for="ch" forName="node" refType="w" fact="0.5"/>
+        <dgm:constr type="h" for="ch" forName="node" refType="h" fact="0.5"/>
+        <dgm:constr type="sp" refType="w" refFor="ch" refForName="node" fact="-0.2"/>
+        <dgm:constr type="sibSp" refType="w" refFor="ch" refForName="node" fact="-0.2"/>
+        <dgm:constr type="primFontSz" for="ch" forName="centerShape" val="65"/>
+        <dgm:constr type="primFontSz" for="des" forName="node" val="65"/>
+        <dgm:constr type="primFontSz" for="ch" forName="node" refType="primFontSz" refFor="ch" refForName="centerShape" op="lte"/>
+      </dgm:constrLst>
+      <dgm:ruleLst/>
+      <dgm:forEach name="Name6" axis="ch" ptType="node" cnt="1">
+        <dgm:layoutNode name="centerShape" styleLbl="vennNode1">
+          <dgm:alg type="tx"/>
+          <dgm:shape xmlns:r="http://schemas.openxmlformats.org/officeDocument/2006/relationships" type="ellipse" r:blip="">
+            <dgm:adjLst/>
+          </dgm:shape>
+          <dgm:presOf axis="self"/>
+          <dgm:constrLst>
+            <dgm:constr type="tMarg" refType="primFontSz" fact="0.1"/>
+            <dgm:constr type="bMarg" refType="primFontSz" fact="0.1"/>
+            <dgm:constr type="lMarg" refType="primFontSz" fact="0.1"/>
+            <dgm:constr type="rMarg" refType="primFontSz" fact="0.1"/>
+          </dgm:constrLst>
+          <dgm:ruleLst>
+            <dgm:rule type="primFontSz" val="5" fact="NaN" max="NaN"/>
+          </dgm:ruleLst>
+        </dgm:layoutNode>
+        <dgm:forEach name="Name7" axis="ch" ptType="node">
+          <dgm:layoutNode name="node" styleLbl="vennNode1">
+            <dgm:varLst>
+              <dgm:bulletEnabled val="1"/>
+            </dgm:varLst>
+            <dgm:alg type="tx">
+              <dgm:param type="txAnchorVertCh" val="mid"/>
+            </dgm:alg>
+            <dgm:shape xmlns:r="http://schemas.openxmlformats.org/officeDocument/2006/relationships" type="ellipse" r:blip="">
+              <dgm:adjLst/>
+            </dgm:shape>
+            <dgm:presOf axis="desOrSelf" ptType="node"/>
+            <dgm:constrLst>
+              <dgm:constr type="tMarg" refType="primFontSz" fact="0.1"/>
+              <dgm:constr type="bMarg" refType="primFontSz" fact="0.1"/>
+              <dgm:constr type="lMarg" refType="primFontSz" fact="0.1"/>
+              <dgm:constr type="rMarg" refType="primFontSz" fact="0.1"/>
+            </dgm:constrLst>
+            <dgm:ruleLst>
+              <dgm:rule type="primFontSz" val="5" fact="NaN" max="NaN"/>
+            </dgm:ruleLst>
+          </dgm:layoutNode>
+        </dgm:forEach>
+      </dgm:forEach>
+    </dgm:layoutNode>
+  </dgm:layoutNode>
+</dgm:layoutDef>
+</file>
+
+<file path=ppt/diagrams/quickStyle1.xml><?xml version="1.0" encoding="utf-8"?>
+<dgm:styleDef xmlns:dgm="http://schemas.openxmlformats.org/drawingml/2006/diagram" xmlns:a="http://schemas.openxmlformats.org/drawingml/2006/main" uniqueId="urn:microsoft.com/office/officeart/2005/8/quickstyle/simple4">
+  <dgm:title val=""/>
+  <dgm:desc val=""/>
+  <dgm:catLst>
+    <dgm:cat type="simple" pri="10400"/>
+  </dgm:catLst>
+  <dgm:scene3d>
+    <a:camera prst="orthographicFront"/>
+    <a:lightRig rig="threePt" dir="t"/>
+  </dgm:scene3d>
+  <dgm:styleLbl name="node0">
+    <dgm:scene3d>
+      <a:camera prst="orthographicFront"/>
+      <a:lightRig rig="threePt" dir="t"/>
+    </dgm:scene3d>
+    <dgm:sp3d/>
+    <dgm:txPr/>
+    <dgm:style>
+      <a:lnRef idx="0">
+        <a:scrgbClr r="0" g="0" b="0"/>
+      </a:lnRef>
+      <a:fillRef idx="3">
+        <a:scrgbClr r="0" g="0" b="0"/>
+      </a:fillRef>
+      <a:effectRef idx="2">
+        <a:scrgbClr r="0" g="0" b="0"/>
+      </a:effectRef>
+      <a:fontRef idx="minor">
+        <a:schemeClr val="lt1"/>
+      </a:fontRef>
+    </dgm:style>
+  </dgm:styleLbl>
+  <dgm:styleLbl name="lnNode1">
+    <dgm:scene3d>
+      <a:camera prst="orthographicFront"/>
+      <a:lightRig rig="threePt" dir="t"/>
+    </dgm:scene3d>
+    <dgm:sp3d/>
+    <dgm:txPr/>
+    <dgm:style>
+      <a:lnRef idx="1">
+        <a:scrgbClr r="0" g="0" b="0"/>
+      </a:lnRef>
+      <a:fillRef idx="3">
+        <a:scrgbClr r="0" g="0" b="0"/>
+      </a:fillRef>
+      <a:effectRef idx="2">
+        <a:scrgbClr r="0" g="0" b="0"/>
+      </a:effectRef>
+      <a:fontRef idx="minor">
+        <a:schemeClr val="lt1"/>
+      </a:fontRef>
+    </dgm:style>
+  </dgm:styleLbl>
+  <dgm:styleLbl name="vennNode1">
+    <dgm:scene3d>
+      <a:camera prst="orthographicFront"/>
+      <a:lightRig rig="threePt" dir="t"/>
+    </dgm:scene3d>
+    <dgm:sp3d/>
+    <dgm:txPr/>
+    <dgm:style>
+      <a:lnRef idx="0">
+        <a:scrgbClr r="0" g="0" b="0"/>
+      </a:lnRef>
+      <a:fillRef idx="3">
+        <a:scrgbClr r="0" g="0" b="0"/>
+      </a:fillRef>
+      <a:effectRef idx="0">
+        <a:scrgbClr r="0" g="0" b="0"/>
+      </a:effectRef>
+      <a:fontRef idx="minor">
+        <a:schemeClr val="tx1"/>
+      </a:fontRef>
+    </dgm:style>
+  </dgm:styleLbl>
+  <dgm:styleLbl name="alignNode1">
+    <dgm:scene3d>
+      <a:camera prst="orthographicFront"/>
+      <a:lightRig rig="threePt" dir="t"/>
+    </dgm:scene3d>
+    <dgm:sp3d/>
+    <dgm:txPr/>
+    <dgm:style>
+      <a:lnRef idx="1">
+        <a:scrgbClr r="0" g="0" b="0"/>
+      </a:lnRef>
+      <a:fillRef idx="3">
+        <a:scrgbClr r="0" g="0" b="0"/>
+      </a:fillRef>
+      <a:effectRef idx="2">
+        <a:scrgbClr r="0" g="0" b="0"/>
+      </a:effectRef>
+      <a:fontRef idx="minor">
+        <a:schemeClr val="lt1"/>
+      </a:fontRef>
+    </dgm:style>
+  </dgm:styleLbl>
+  <dgm:styleLbl name="node1">
+    <dgm:scene3d>
+      <a:camera prst="orthographicFront"/>
+      <a:lightRig rig="threePt" dir="t"/>
+    </dgm:scene3d>
+    <dgm:sp3d/>
+    <dgm:txPr/>
+    <dgm:style>
+      <a:lnRef idx="0">
+        <a:scrgbClr r="0" g="0" b="0"/>
+      </a:lnRef>
+      <a:fillRef idx="3">
+        <a:scrgbClr r="0" g="0" b="0"/>
+      </a:fillRef>
+      <a:effectRef idx="2">
+        <a:scrgbClr r="0" g="0" b="0"/>
+      </a:effectRef>
+      <a:fontRef idx="minor">
+        <a:schemeClr val="lt1"/>
+      </a:fontRef>
+    </dgm:style>
+  </dgm:styleLbl>
+  <dgm:styleLbl name="node2">
+    <dgm:scene3d>
+      <a:camera prst="orthographicFront"/>
+      <a:lightRig rig="threePt" dir="t"/>
+    </dgm:scene3d>
+    <dgm:sp3d/>
+    <dgm:txPr/>
+    <dgm:style>
+      <a:lnRef idx="0">
+        <a:scrgbClr r="0" g="0" b="0"/>
+      </a:lnRef>
+      <a:fillRef idx="3">
+        <a:scrgbClr r="0" g="0" b="0"/>
+      </a:fillRef>
+      <a:effectRef idx="2">
+        <a:scrgbClr r="0" g="0" b="0"/>
+      </a:effectRef>
+      <a:fontRef idx="minor">
+        <a:schemeClr val="lt1"/>
+      </a:fontRef>
+    </dgm:style>
+  </dgm:styleLbl>
+  <dgm:styleLbl name="node3">
+    <dgm:scene3d>
+      <a:camera prst="orthographicFront"/>
+      <a:lightRig rig="threePt" dir="t"/>
+    </dgm:scene3d>
+    <dgm:sp3d/>
+    <dgm:txPr/>
+    <dgm:style>
+      <a:lnRef idx="0">
+        <a:scrgbClr r="0" g="0" b="0"/>
+      </a:lnRef>
+      <a:fillRef idx="3">
+        <a:scrgbClr r="0" g="0" b="0"/>
+      </a:fillRef>
+      <a:effectRef idx="2">
+        <a:scrgbClr r="0" g="0" b="0"/>
+      </a:effectRef>
+      <a:fontRef idx="minor">
+        <a:schemeClr val="lt1"/>
+      </a:fontRef>
+    </dgm:style>
+  </dgm:styleLbl>
+  <dgm:styleLbl name="node4">
+    <dgm:scene3d>
+      <a:camera prst="orthographicFront"/>
+      <a:lightRig rig="threePt" dir="t"/>
+    </dgm:scene3d>
+    <dgm:sp3d/>
+    <dgm:txPr/>
+    <dgm:style>
+      <a:lnRef idx="0">
+        <a:scrgbClr r="0" g="0" b="0"/>
+      </a:lnRef>
+      <a:fillRef idx="3">
+        <a:scrgbClr r="0" g="0" b="0"/>
+      </a:fillRef>
+      <a:effectRef idx="2">
+        <a:scrgbClr r="0" g="0" b="0"/>
+      </a:effectRef>
+      <a:fontRef idx="minor">
+        <a:schemeClr val="lt1"/>
+      </a:fontRef>
+    </dgm:style>
+  </dgm:styleLbl>
+  <dgm:styleLbl name="fgImgPlace1">
+    <dgm:scene3d>
+      <a:camera prst="orthographicFront"/>
+      <a:lightRig rig="threePt" dir="t"/>
+    </dgm:scene3d>
+    <dgm:sp3d/>
+    <dgm:txPr/>
+    <dgm:style>
+      <a:lnRef idx="0">
+        <a:scrgbClr r="0" g="0" b="0"/>
+      </a:lnRef>
+      <a:fillRef idx="1">
+        <a:scrgbClr r="0" g="0" b="0"/>
+      </a:fillRef>
+      <a:effectRef idx="2">
+        <a:scrgbClr r="0" g="0" b="0"/>
+      </a:effectRef>
+      <a:fontRef idx="minor"/>
+    </dgm:style>
+  </dgm:styleLbl>
+  <dgm:styleLbl name="alignImgPlace1">
+    <dgm:scene3d>
+      <a:camera prst="orthographicFront"/>
+      <a:lightRig rig="threePt" dir="t"/>
+    </dgm:scene3d>
+    <dgm:sp3d/>
+    <dgm:txPr/>
+    <dgm:style>
+      <a:lnRef idx="0">
+        <a:scrgbClr r="0" g="0" b="0"/>
+      </a:lnRef>
+      <a:fillRef idx="1">
+        <a:scrgbClr r="0" g="0" b="0"/>
+      </a:fillRef>
+      <a:effectRef idx="2">
+        <a:scrgbClr r="0" g="0" b="0"/>
+      </a:effectRef>
+      <a:fontRef idx="minor"/>
+    </dgm:style>
+  </dgm:styleLbl>
+  <dgm:styleLbl name="bgImgPlace1">
+    <dgm:scene3d>
+      <a:camera prst="orthographicFront"/>
+      <a:lightRig rig="threePt" dir="t"/>
+    </dgm:scene3d>
+    <dgm:sp3d/>
+    <dgm:txPr/>
+    <dgm:style>
+      <a:lnRef idx="0">
+        <a:scrgbClr r="0" g="0" b="0"/>
+      </a:lnRef>
+      <a:fillRef idx="1">
+        <a:scrgbClr r="0" g="0" b="0"/>
+      </a:fillRef>
+      <a:effectRef idx="2">
+        <a:scrgbClr r="0" g="0" b="0"/>
+      </a:effectRef>
+      <a:fontRef idx="minor"/>
+    </dgm:style>
+  </dgm:styleLbl>
+  <dgm:styleLbl name="sibTrans2D1">
+    <dgm:scene3d>
+      <a:camera prst="orthographicFront"/>
+      <a:lightRig rig="threePt" dir="t"/>
+    </dgm:scene3d>
+    <dgm:sp3d/>
+    <dgm:txPr/>
+    <dgm:style>
+      <a:lnRef idx="0">
+        <a:scrgbClr r="0" g="0" b="0"/>
+      </a:lnRef>
+      <a:fillRef idx="3">
+        <a:scrgbClr r="0" g="0" b="0"/>
+      </a:fillRef>
+      <a:effectRef idx="2">
+        <a:scrgbClr r="0" g="0" b="0"/>
+      </a:effectRef>
+      <a:fontRef idx="minor">
+        <a:schemeClr val="lt1"/>
+      </a:fontRef>
+    </dgm:style>
+  </dgm:styleLbl>
+  <dgm:styleLbl name="fgSibTrans2D1">
+    <dgm:scene3d>
+      <a:camera prst="orthographicFront"/>
+      <a:lightRig rig="threePt" dir="t"/>
+    </dgm:scene3d>
+    <dgm:sp3d/>
+    <dgm:txPr/>
+    <dgm:style>
+      <a:lnRef idx="0">
+        <a:scrgbClr r="0" g="0" b="0"/>
+      </a:lnRef>
+      <a:fillRef idx="3">
+        <a:scrgbClr r="0" g="0" b="0"/>
+      </a:fillRef>
+      <a:effectRef idx="2">
+        <a:scrgbClr r="0" g="0" b="0"/>
+      </a:effectRef>
+      <a:fontRef idx="minor">
+        <a:schemeClr val="lt1"/>
+      </a:fontRef>
+    </dgm:style>
+  </dgm:styleLbl>
+  <dgm:styleLbl name="bgSibTrans2D1">
+    <dgm:scene3d>
+      <a:camera prst="orthographicFront"/>
+      <a:lightRig rig="threePt" dir="t"/>
+    </dgm:scene3d>
+    <dgm:sp3d/>
+    <dgm:txPr/>
+    <dgm:style>
+      <a:lnRef idx="0">
+        <a:scrgbClr r="0" g="0" b="0"/>
+      </a:lnRef>
+      <a:fillRef idx="3">
+        <a:scrgbClr r="0" g="0" b="0"/>
+      </a:fillRef>
+      <a:effectRef idx="2">
+        <a:scrgbClr r="0" g="0" b="0"/>
+      </a:effectRef>
+      <a:fontRef idx="minor">
+        <a:schemeClr val="lt1"/>
+      </a:fontRef>
+    </dgm:style>
+  </dgm:styleLbl>
+  <dgm:styleLbl name="sibTrans1D1">
+    <dgm:scene3d>
+      <a:camera prst="orthographicFront"/>
+      <a:lightRig rig="threePt" dir="t"/>
+    </dgm:scene3d>
+    <dgm:sp3d/>
+    <dgm:txPr/>
+    <dgm:style>
+      <a:lnRef idx="1">
+        <a:scrgbClr r="0" g="0" b="0"/>
+      </a:lnRef>
+      <a:fillRef idx="0">
+        <a:scrgbClr r="0" g="0" b="0"/>
+      </a:fillRef>
+      <a:effectRef idx="0">
+        <a:scrgbClr r="0" g="0" b="0"/>
+      </a:effectRef>
+      <a:fontRef idx="minor"/>
+    </dgm:style>
+  </dgm:styleLbl>
+  <dgm:styleLbl name="callout">
+    <dgm:scene3d>
+      <a:camera prst="orthographicFront"/>
+      <a:lightRig rig="threePt" dir="t"/>
+    </dgm:scene3d>
+    <dgm:sp3d/>
+    <dgm:txPr/>
+    <dgm:style>
+      <a:lnRef idx="2">
+        <a:scrgbClr r="0" g="0" b="0"/>
+      </a:lnRef>
+      <a:fillRef idx="1">
+        <a:scrgbClr r="0" g="0" b="0"/>
+      </a:fillRef>
+      <a:effectRef idx="1">
+        <a:scrgbClr r="0" g="0" b="0"/>
+      </a:effectRef>
+      <a:fontRef idx="minor"/>
+    </dgm:style>
+  </dgm:styleLbl>
+  <dgm:styleLbl name="asst0">
+    <dgm:scene3d>
+      <a:camera prst="orthographicFront"/>
+      <a:lightRig rig="threePt" dir="t"/>
+    </dgm:scene3d>
+    <dgm:sp3d/>
+    <dgm:txPr/>
+    <dgm:style>
+      <a:lnRef idx="0">
+        <a:scrgbClr r="0" g="0" b="0"/>
+      </a:lnRef>
+      <a:fillRef idx="3">
+        <a:scrgbClr r="0" g="0" b="0"/>
+      </a:fillRef>
+      <a:effectRef idx="2">
+        <a:scrgbClr r="0" g="0" b="0"/>
+      </a:effectRef>
+      <a:fontRef idx="minor">
+        <a:schemeClr val="lt1"/>
+      </a:fontRef>
+    </dgm:style>
+  </dgm:styleLbl>
+  <dgm:styleLbl name="asst1">
+    <dgm:scene3d>
+      <a:camera prst="orthographicFront"/>
+      <a:lightRig rig="threePt" dir="t"/>
+    </dgm:scene3d>
+    <dgm:sp3d/>
+    <dgm:txPr/>
+    <dgm:style>
+      <a:lnRef idx="0">
+        <a:scrgbClr r="0" g="0" b="0"/>
+      </a:lnRef>
+      <a:fillRef idx="3">
+        <a:scrgbClr r="0" g="0" b="0"/>
+      </a:fillRef>
+      <a:effectRef idx="2">
+        <a:scrgbClr r="0" g="0" b="0"/>
+      </a:effectRef>
+      <a:fontRef idx="minor">
+        <a:schemeClr val="lt1"/>
+      </a:fontRef>
+    </dgm:style>
+  </dgm:styleLbl>
+  <dgm:styleLbl name="asst2">
+    <dgm:scene3d>
+      <a:camera prst="orthographicFront"/>
+      <a:lightRig rig="threePt" dir="t"/>
+    </dgm:scene3d>
+    <dgm:sp3d/>
+    <dgm:txPr/>
+    <dgm:style>
+      <a:lnRef idx="0">
+        <a:scrgbClr r="0" g="0" b="0"/>
+      </a:lnRef>
+      <a:fillRef idx="3">
+        <a:scrgbClr r="0" g="0" b="0"/>
+      </a:fillRef>
+      <a:effectRef idx="2">
+        <a:scrgbClr r="0" g="0" b="0"/>
+      </a:effectRef>
+      <a:fontRef idx="minor">
+        <a:schemeClr val="lt1"/>
+      </a:fontRef>
+    </dgm:style>
+  </dgm:styleLbl>
+  <dgm:styleLbl name="asst3">
+    <dgm:scene3d>
+      <a:camera prst="orthographicFront"/>
+      <a:lightRig rig="threePt" dir="t"/>
+    </dgm:scene3d>
+    <dgm:sp3d/>
+    <dgm:txPr/>
+    <dgm:style>
+      <a:lnRef idx="0">
+        <a:scrgbClr r="0" g="0" b="0"/>
+      </a:lnRef>
+      <a:fillRef idx="3">
+        <a:scrgbClr r="0" g="0" b="0"/>
+      </a:fillRef>
+      <a:effectRef idx="2">
+        <a:scrgbClr r="0" g="0" b="0"/>
+      </a:effectRef>
+      <a:fontRef idx="minor">
+        <a:schemeClr val="lt1"/>
+      </a:fontRef>
+    </dgm:style>
+  </dgm:styleLbl>
+  <dgm:styleLbl name="asst4">
+    <dgm:scene3d>
+      <a:camera prst="orthographicFront"/>
+      <a:lightRig rig="threePt" dir="t"/>
+    </dgm:scene3d>
+    <dgm:sp3d/>
+    <dgm:txPr/>
+    <dgm:style>
+      <a:lnRef idx="0">
+        <a:scrgbClr r="0" g="0" b="0"/>
+      </a:lnRef>
+      <a:fillRef idx="3">
+        <a:scrgbClr r="0" g="0" b="0"/>
+      </a:fillRef>
+      <a:effectRef idx="2">
+        <a:scrgbClr r="0" g="0" b="0"/>
+      </a:effectRef>
+      <a:fontRef idx="minor">
+        <a:schemeClr val="lt1"/>
+      </a:fontRef>
+    </dgm:style>
+  </dgm:styleLbl>
+  <dgm:styleLbl name="parChTrans2D1">
+    <dgm:scene3d>
+      <a:camera prst="orthographicFront"/>
+      <a:lightRig rig="threePt" dir="t"/>
+    </dgm:scene3d>
+    <dgm:sp3d/>
+    <dgm:txPr/>
+    <dgm:style>
+      <a:lnRef idx="0">
+        <a:scrgbClr r="0" g="0" b="0"/>
+      </a:lnRef>
+      <a:fillRef idx="3">
+        <a:scrgbClr r="0" g="0" b="0"/>
+      </a:fillRef>
+      <a:effectRef idx="2">
+        <a:scrgbClr r="0" g="0" b="0"/>
+      </a:effectRef>
+      <a:fontRef idx="minor">
+        <a:schemeClr val="lt1"/>
+      </a:fontRef>
+    </dgm:style>
+  </dgm:styleLbl>
+  <dgm:styleLbl name="parChTrans2D2">
+    <dgm:scene3d>
+      <a:camera prst="orthographicFront"/>
+      <a:lightRig rig="threePt" dir="t"/>
+    </dgm:scene3d>
+    <dgm:sp3d/>
+    <dgm:txPr/>
+    <dgm:style>
+      <a:lnRef idx="0">
+        <a:scrgbClr r="0" g="0" b="0"/>
+      </a:lnRef>
+      <a:fillRef idx="3">
+        <a:scrgbClr r="0" g="0" b="0"/>
+      </a:fillRef>
+      <a:effectRef idx="2">
+        <a:scrgbClr r="0" g="0" b="0"/>
+      </a:effectRef>
+      <a:fontRef idx="minor">
+        <a:schemeClr val="lt1"/>
+      </a:fontRef>
+    </dgm:style>
+  </dgm:styleLbl>
+  <dgm:styleLbl name="parChTrans2D3">
+    <dgm:scene3d>
+      <a:camera prst="orthographicFront"/>
+      <a:lightRig rig="threePt" dir="t"/>
+    </dgm:scene3d>
+    <dgm:sp3d/>
+    <dgm:txPr/>
+    <dgm:style>
+      <a:lnRef idx="1">
+        <a:scrgbClr r="0" g="0" b="0"/>
+      </a:lnRef>
+      <a:fillRef idx="3">
+        <a:scrgbClr r="0" g="0" b="0"/>
+      </a:fillRef>
+      <a:effectRef idx="2">
+        <a:scrgbClr r="0" g="0" b="0"/>
+      </a:effectRef>
+      <a:fontRef idx="minor">
+        <a:schemeClr val="lt1"/>
+      </a:fontRef>
+    </dgm:style>
+  </dgm:styleLbl>
+  <dgm:styleLbl name="parChTrans2D4">
+    <dgm:scene3d>
+      <a:camera prst="orthographicFront"/>
+      <a:lightRig rig="threePt" dir="t"/>
+    </dgm:scene3d>
+    <dgm:sp3d/>
+    <dgm:txPr/>
+    <dgm:style>
+      <a:lnRef idx="1">
+        <a:scrgbClr r="0" g="0" b="0"/>
+      </a:lnRef>
+      <a:fillRef idx="3">
+        <a:scrgbClr r="0" g="0" b="0"/>
+      </a:fillRef>
+      <a:effectRef idx="2">
+        <a:scrgbClr r="0" g="0" b="0"/>
+      </a:effectRef>
+      <a:fontRef idx="minor">
+        <a:schemeClr val="lt1"/>
+      </a:fontRef>
+    </dgm:style>
+  </dgm:styleLbl>
+  <dgm:styleLbl name="parChTrans1D1">
+    <dgm:scene3d>
+      <a:camera prst="orthographicFront"/>
+      <a:lightRig rig="threePt" dir="t"/>
+    </dgm:scene3d>
+    <dgm:sp3d/>
+    <dgm:txPr/>
+    <dgm:style>
+      <a:lnRef idx="1">
+        <a:scrgbClr r="0" g="0" b="0"/>
+      </a:lnRef>
+      <a:fillRef idx="0">
+        <a:scrgbClr r="0" g="0" b="0"/>
+      </a:fillRef>
+      <a:effectRef idx="0">
+        <a:scrgbClr r="0" g="0" b="0"/>
+      </a:effectRef>
+      <a:fontRef idx="minor"/>
+    </dgm:style>
+  </dgm:styleLbl>
+  <dgm:styleLbl name="parChTrans1D2">
+    <dgm:scene3d>
+      <a:camera prst="orthographicFront"/>
+      <a:lightRig rig="threePt" dir="t"/>
+    </dgm:scene3d>
+    <dgm:sp3d/>
+    <dgm:txPr/>
+    <dgm:style>
+      <a:lnRef idx="1">
+        <a:scrgbClr r="0" g="0" b="0"/>
+      </a:lnRef>
+      <a:fillRef idx="0">
+        <a:scrgbClr r="0" g="0" b="0"/>
+      </a:fillRef>
+      <a:effectRef idx="0">
+        <a:scrgbClr r="0" g="0" b="0"/>
+      </a:effectRef>
+      <a:fontRef idx="minor"/>
+    </dgm:style>
+  </dgm:styleLbl>
+  <dgm:styleLbl name="parChTrans1D3">
+    <dgm:scene3d>
+      <a:camera prst="orthographicFront"/>
+      <a:lightRig rig="threePt" dir="t"/>
+    </dgm:scene3d>
+    <dgm:sp3d/>
+    <dgm:txPr/>
+    <dgm:style>
+      <a:lnRef idx="1">
+        <a:scrgbClr r="0" g="0" b="0"/>
+      </a:lnRef>
+      <a:fillRef idx="0">
+        <a:scrgbClr r="0" g="0" b="0"/>
+      </a:fillRef>
+      <a:effectRef idx="0">
+        <a:scrgbClr r="0" g="0" b="0"/>
+      </a:effectRef>
+      <a:fontRef idx="minor"/>
+    </dgm:style>
+  </dgm:styleLbl>
+  <dgm:styleLbl name="parChTrans1D4">
+    <dgm:scene3d>
+      <a:camera prst="orthographicFront"/>
+      <a:lightRig rig="threePt" dir="t"/>
+    </dgm:scene3d>
+    <dgm:sp3d/>
+    <dgm:txPr/>
+    <dgm:style>
+      <a:lnRef idx="1">
+        <a:scrgbClr r="0" g="0" b="0"/>
+      </a:lnRef>
+      <a:fillRef idx="0">
+        <a:scrgbClr r="0" g="0" b="0"/>
+      </a:fillRef>
+      <a:effectRef idx="0">
+        <a:scrgbClr r="0" g="0" b="0"/>
+      </a:effectRef>
+      <a:fontRef idx="minor"/>
+    </dgm:style>
+  </dgm:styleLbl>
+  <dgm:styleLbl name="fgAcc1">
+    <dgm:scene3d>
+      <a:camera prst="orthographicFront"/>
+      <a:lightRig rig="threePt" dir="t"/>
+    </dgm:scene3d>
+    <dgm:sp3d/>
+    <dgm:txPr/>
+    <dgm:style>
+      <a:lnRef idx="1">
+        <a:scrgbClr r="0" g="0" b="0"/>
+      </a:lnRef>
+      <a:fillRef idx="1">
+        <a:scrgbClr r="0" g="0" b="0"/>
+      </a:fillRef>
+      <a:effectRef idx="0">
+        <a:scrgbClr r="0" g="0" b="0"/>
+      </a:effectRef>
+      <a:fontRef idx="minor"/>
+    </dgm:style>
+  </dgm:styleLbl>
+  <dgm:styleLbl name="conFgAcc1">
+    <dgm:scene3d>
+      <a:camera prst="orthographicFront"/>
+      <a:lightRig rig="threePt" dir="t"/>
+    </dgm:scene3d>
+    <dgm:sp3d/>
+    <dgm:txPr/>
+    <dgm:style>
+      <a:lnRef idx="1">
+        <a:scrgbClr r="0" g="0" b="0"/>
+      </a:lnRef>
+      <a:fillRef idx="1">
+        <a:scrgbClr r="0" g="0" b="0"/>
+      </a:fillRef>
+      <a:effectRef idx="0">
+        <a:scrgbClr r="0" g="0" b="0"/>
+      </a:effectRef>
+      <a:fontRef idx="minor"/>
+    </dgm:style>
+  </dgm:styleLbl>
+  <dgm:styleLbl name="alignAcc1">
+    <dgm:scene3d>
+      <a:camera prst="orthographicFront"/>
+      <a:lightRig rig="threePt" dir="t"/>
+    </dgm:scene3d>
+    <dgm:sp3d/>
+    <dgm:txPr/>
+    <dgm:style>
+      <a:lnRef idx="1">
+        <a:scrgbClr r="0" g="0" b="0"/>
+      </a:lnRef>
+      <a:fillRef idx="1">
+        <a:scrgbClr r="0" g="0" b="0"/>
+      </a:fillRef>
+      <a:effectRef idx="0">
+        <a:scrgbClr r="0" g="0" b="0"/>
+      </a:effectRef>
+      <a:fontRef idx="minor"/>
+    </dgm:style>
+  </dgm:styleLbl>
+  <dgm:styleLbl name="trAlignAcc1">
+    <dgm:scene3d>
+      <a:camera prst="orthographicFront"/>
+      <a:lightRig rig="threePt" dir="t"/>
+    </dgm:scene3d>
+    <dgm:sp3d/>
+    <dgm:txPr/>
+    <dgm:style>
+      <a:lnRef idx="1">
+        <a:scrgbClr r="0" g="0" b="0"/>
+      </a:lnRef>
+      <a:fillRef idx="1">
+        <a:scrgbClr r="0" g="0" b="0"/>
+      </a:fillRef>
+      <a:effectRef idx="0">
+        <a:scrgbClr r="0" g="0" b="0"/>
+      </a:effectRef>
+      <a:fontRef idx="minor"/>
+    </dgm:style>
+  </dgm:styleLbl>
+  <dgm:styleLbl name="bgAcc1">
+    <dgm:scene3d>
+      <a:camera prst="orthographicFront"/>
+      <a:lightRig rig="threePt" dir="t"/>
+    </dgm:scene3d>
+    <dgm:sp3d/>
+    <dgm:txPr/>
+    <dgm:style>
+      <a:lnRef idx="1">
+        <a:scrgbClr r="0" g="0" b="0"/>
+      </a:lnRef>
+      <a:fillRef idx="1">
+        <a:scrgbClr r="0" g="0" b="0"/>
+      </a:fillRef>
+      <a:effectRef idx="0">
+        <a:scrgbClr r="0" g="0" b="0"/>
+      </a:effectRef>
+      <a:fontRef idx="minor"/>
+    </dgm:style>
+  </dgm:styleLbl>
+  <dgm:styleLbl name="solidFgAcc1">
+    <dgm:scene3d>
+      <a:camera prst="orthographicFront"/>
+      <a:lightRig rig="threePt" dir="t"/>
+    </dgm:scene3d>
+    <dgm:sp3d/>
+    <dgm:txPr/>
+    <dgm:style>
+      <a:lnRef idx="1">
+        <a:scrgbClr r="0" g="0" b="0"/>
+      </a:lnRef>
+      <a:fillRef idx="1">
+        <a:scrgbClr r="0" g="0" b="0"/>
+      </a:fillRef>
+      <a:effectRef idx="0">
+        <a:scrgbClr r="0" g="0" b="0"/>
+      </a:effectRef>
+      <a:fontRef idx="minor"/>
+    </dgm:style>
+  </dgm:styleLbl>
+  <dgm:styleLbl name="solidAlignAcc1">
+    <dgm:scene3d>
+      <a:camera prst="orthographicFront"/>
+      <a:lightRig rig="threePt" dir="t"/>
+    </dgm:scene3d>
+    <dgm:sp3d/>
+    <dgm:txPr/>
+    <dgm:style>
+      <a:lnRef idx="1">
+        <a:scrgbClr r="0" g="0" b="0"/>
+      </a:lnRef>
+      <a:fillRef idx="1">
+        <a:scrgbClr r="0" g="0" b="0"/>
+      </a:fillRef>
+      <a:effectRef idx="0">
+        <a:scrgbClr r="0" g="0" b="0"/>
+      </a:effectRef>
+      <a:fontRef idx="minor"/>
+    </dgm:style>
+  </dgm:styleLbl>
+  <dgm:styleLbl name="solidBgAcc1">
+    <dgm:scene3d>
+      <a:camera prst="orthographicFront"/>
+      <a:lightRig rig="threePt" dir="t"/>
+    </dgm:scene3d>
+    <dgm:sp3d/>
+    <dgm:txPr/>
+    <dgm:style>
+      <a:lnRef idx="1">
+        <a:scrgbClr r="0" g="0" b="0"/>
+      </a:lnRef>
+      <a:fillRef idx="1">
+        <a:scrgbClr r="0" g="0" b="0"/>
+      </a:fillRef>
+      <a:effectRef idx="0">
+        <a:scrgbClr r="0" g="0" b="0"/>
+      </a:effectRef>
+      <a:fontRef idx="minor"/>
+    </dgm:style>
+  </dgm:styleLbl>
+  <dgm:styleLbl name="fgAccFollowNode1">
+    <dgm:scene3d>
+      <a:camera prst="orthographicFront"/>
+      <a:lightRig rig="threePt" dir="t"/>
+    </dgm:scene3d>
+    <dgm:sp3d/>
+    <dgm:txPr/>
+    <dgm:style>
+      <a:lnRef idx="1">
+        <a:scrgbClr r="0" g="0" b="0"/>
+      </a:lnRef>
+      <a:fillRef idx="1">
+        <a:scrgbClr r="0" g="0" b="0"/>
+      </a:fillRef>
+      <a:effectRef idx="0">
+        <a:scrgbClr r="0" g="0" b="0"/>
+      </a:effectRef>
+      <a:fontRef idx="minor"/>
+    </dgm:style>
+  </dgm:styleLbl>
+  <dgm:styleLbl name="alignAccFollowNode1">
+    <dgm:scene3d>
+      <a:camera prst="orthographicFront"/>
+      <a:lightRig rig="threePt" dir="t"/>
+    </dgm:scene3d>
+    <dgm:sp3d/>
+    <dgm:txPr/>
+    <dgm:style>
+      <a:lnRef idx="1">
+        <a:scrgbClr r="0" g="0" b="0"/>
+      </a:lnRef>
+      <a:fillRef idx="1">
+        <a:scrgbClr r="0" g="0" b="0"/>
+      </a:fillRef>
+      <a:effectRef idx="0">
+        <a:scrgbClr r="0" g="0" b="0"/>
+      </a:effectRef>
+      <a:fontRef idx="minor"/>
+    </dgm:style>
+  </dgm:styleLbl>
+  <dgm:styleLbl name="bgAccFollowNode1">
+    <dgm:scene3d>
+      <a:camera prst="orthographicFront"/>
+      <a:lightRig rig="threePt" dir="t"/>
+    </dgm:scene3d>
+    <dgm:sp3d/>
+    <dgm:txPr/>
+    <dgm:style>
+      <a:lnRef idx="1">
+        <a:scrgbClr r="0" g="0" b="0"/>
+      </a:lnRef>
+      <a:fillRef idx="1">
+        <a:scrgbClr r="0" g="0" b="0"/>
+      </a:fillRef>
+      <a:effectRef idx="0">
+        <a:scrgbClr r="0" g="0" b="0"/>
+      </a:effectRef>
+      <a:fontRef idx="minor"/>
+    </dgm:style>
+  </dgm:styleLbl>
+  <dgm:styleLbl name="fgAcc0">
+    <dgm:scene3d>
+      <a:camera prst="orthographicFront"/>
+      <a:lightRig rig="threePt" dir="t"/>
+    </dgm:scene3d>
+    <dgm:sp3d/>
+    <dgm:txPr/>
+    <dgm:style>
+      <a:lnRef idx="1">
+        <a:scrgbClr r="0" g="0" b="0"/>
+      </a:lnRef>
+      <a:fillRef idx="1">
+        <a:scrgbClr r="0" g="0" b="0"/>
+      </a:fillRef>
+      <a:effectRef idx="0">
+        <a:scrgbClr r="0" g="0" b="0"/>
+      </a:effectRef>
+      <a:fontRef idx="minor"/>
+    </dgm:style>
+  </dgm:styleLbl>
+  <dgm:styleLbl name="fgAcc2">
+    <dgm:scene3d>
+      <a:camera prst="orthographicFront"/>
+      <a:lightRig rig="threePt" dir="t"/>
+    </dgm:scene3d>
+    <dgm:sp3d/>
+    <dgm:txPr/>
+    <dgm:style>
+      <a:lnRef idx="1">
+        <a:scrgbClr r="0" g="0" b="0"/>
+      </a:lnRef>
+      <a:fillRef idx="1">
+        <a:scrgbClr r="0" g="0" b="0"/>
+      </a:fillRef>
+      <a:effectRef idx="0">
+        <a:scrgbClr r="0" g="0" b="0"/>
+      </a:effectRef>
+      <a:fontRef idx="minor"/>
+    </dgm:style>
+  </dgm:styleLbl>
+  <dgm:styleLbl name="fgAcc3">
+    <dgm:scene3d>
+      <a:camera prst="orthographicFront"/>
+      <a:lightRig rig="threePt" dir="t"/>
+    </dgm:scene3d>
+    <dgm:sp3d/>
+    <dgm:txPr/>
+    <dgm:style>
+      <a:lnRef idx="1">
+        <a:scrgbClr r="0" g="0" b="0"/>
+      </a:lnRef>
+      <a:fillRef idx="1">
+        <a:scrgbClr r="0" g="0" b="0"/>
+      </a:fillRef>
+      <a:effectRef idx="0">
+        <a:scrgbClr r="0" g="0" b="0"/>
+      </a:effectRef>
+      <a:fontRef idx="minor"/>
+    </dgm:style>
+  </dgm:styleLbl>
+  <dgm:styleLbl name="fgAcc4">
+    <dgm:scene3d>
+      <a:camera prst="orthographicFront"/>
+      <a:lightRig rig="threePt" dir="t"/>
+    </dgm:scene3d>
+    <dgm:sp3d/>
+    <dgm:txPr/>
+    <dgm:style>
+      <a:lnRef idx="1">
+        <a:scrgbClr r="0" g="0" b="0"/>
+      </a:lnRef>
+      <a:fillRef idx="1">
+        <a:scrgbClr r="0" g="0" b="0"/>
+      </a:fillRef>
+      <a:effectRef idx="0">
+        <a:scrgbClr r="0" g="0" b="0"/>
+      </a:effectRef>
+      <a:fontRef idx="minor"/>
+    </dgm:style>
+  </dgm:styleLbl>
+  <dgm:styleLbl name="bgShp">
+    <dgm:scene3d>
+      <a:camera prst="orthographicFront"/>
+      <a:lightRig rig="threePt" dir="t"/>
+    </dgm:scene3d>
+    <dgm:sp3d/>
+    <dgm:txPr/>
+    <dgm:style>
+      <a:lnRef idx="0">
+        <a:scrgbClr r="0" g="0" b="0"/>
+      </a:lnRef>
+      <a:fillRef idx="1">
+        <a:scrgbClr r="0" g="0" b="0"/>
+      </a:fillRef>
+      <a:effectRef idx="2">
+        <a:scrgbClr r="0" g="0" b="0"/>
+      </a:effectRef>
+      <a:fontRef idx="minor"/>
+    </dgm:style>
+  </dgm:styleLbl>
+  <dgm:styleLbl name="dkBgShp">
+    <dgm:scene3d>
+      <a:camera prst="orthographicFront"/>
+      <a:lightRig rig="threePt" dir="t"/>
+    </dgm:scene3d>
+    <dgm:sp3d/>
+    <dgm:txPr/>
+    <dgm:style>
+      <a:lnRef idx="0">
+        <a:scrgbClr r="0" g="0" b="0"/>
+      </a:lnRef>
+      <a:fillRef idx="1">
+        <a:scrgbClr r="0" g="0" b="0"/>
+      </a:fillRef>
+      <a:effectRef idx="2">
+        <a:scrgbClr r="0" g="0" b="0"/>
+      </a:effectRef>
+      <a:fontRef idx="minor"/>
+    </dgm:style>
+  </dgm:styleLbl>
+  <dgm:styleLbl name="trBgShp">
+    <dgm:scene3d>
+      <a:camera prst="orthographicFront"/>
+      <a:lightRig rig="threePt" dir="t"/>
+    </dgm:scene3d>
+    <dgm:sp3d/>
+    <dgm:txPr/>
+    <dgm:style>
+      <a:lnRef idx="0">
+        <a:scrgbClr r="0" g="0" b="0"/>
+      </a:lnRef>
+      <a:fillRef idx="1">
+        <a:scrgbClr r="0" g="0" b="0"/>
+      </a:fillRef>
+      <a:effectRef idx="0">
+        <a:scrgbClr r="0" g="0" b="0"/>
+      </a:effectRef>
+      <a:fontRef idx="minor"/>
+    </dgm:style>
+  </dgm:styleLbl>
+  <dgm:styleLbl name="fgShp">
+    <dgm:scene3d>
+      <a:camera prst="orthographicFront"/>
+      <a:lightRig rig="threePt" dir="t"/>
+    </dgm:scene3d>
+    <dgm:sp3d/>
+    <dgm:txPr/>
+    <dgm:style>
+      <a:lnRef idx="0">
+        <a:scrgbClr r="0" g="0" b="0"/>
+      </a:lnRef>
+      <a:fillRef idx="3">
+        <a:scrgbClr r="0" g="0" b="0"/>
+      </a:fillRef>
+      <a:effectRef idx="2">
+        <a:scrgbClr r="0" g="0" b="0"/>
+      </a:effectRef>
+      <a:fontRef idx="minor"/>
+    </dgm:style>
+  </dgm:styleLbl>
+  <dgm:styleLbl name="revTx">
+    <dgm:scene3d>
+      <a:camera prst="orthographicFront"/>
+      <a:lightRig rig="threePt" dir="t"/>
+    </dgm:scene3d>
+    <dgm:sp3d/>
+    <dgm:txPr/>
+    <dgm:style>
+      <a:lnRef idx="0">
+        <a:scrgbClr r="0" g="0" b="0"/>
+      </a:lnRef>
+      <a:fillRef idx="0">
+        <a:scrgbClr r="0" g="0" b="0"/>
+      </a:fillRef>
+      <a:effectRef idx="0">
+        <a:scrgbClr r="0" g="0" b="0"/>
+      </a:effectRef>
+      <a:fontRef idx="minor"/>
+    </dgm:style>
+  </dgm:styleLbl>
+</dgm:styleDef>
 </file>
 
 <file path=ppt/slideLayouts/slideLayout1.xml><?xml version="1.0" encoding="utf-8"?>
@@ -5102,6 +8373,482 @@
   <p:clrMapOvr>
     <a:masterClrMapping/>
   </p:clrMapOvr>
+  <p:timing>
+    <p:tnLst>
+      <p:par>
+        <p:cTn id="1" dur="indefinite" restart="never" nodeType="tmRoot"/>
+      </p:par>
+    </p:tnLst>
+  </p:timing>
+</p:sld>
+</file>
+
+<file path=ppt/slides/slide2.xml><?xml version="1.0" encoding="utf-8"?>
+<p:sld xmlns:a="http://schemas.openxmlformats.org/drawingml/2006/main" xmlns:r="http://schemas.openxmlformats.org/officeDocument/2006/relationships" xmlns:p="http://schemas.openxmlformats.org/presentationml/2006/main">
+  <p:cSld>
+    <p:spTree>
+      <p:nvGrpSpPr>
+        <p:cNvPr id="1" name=""/>
+        <p:cNvGrpSpPr/>
+        <p:nvPr/>
+      </p:nvGrpSpPr>
+      <p:grpSpPr>
+        <a:xfrm>
+          <a:off x="0" y="0"/>
+          <a:ext cx="0" cy="0"/>
+          <a:chOff x="0" y="0"/>
+          <a:chExt cx="0" cy="0"/>
+        </a:xfrm>
+      </p:grpSpPr>
+      <p:graphicFrame>
+        <p:nvGraphicFramePr>
+          <p:cNvPr id="3" name="Diagram 2"/>
+          <p:cNvGraphicFramePr/>
+          <p:nvPr>
+            <p:extLst>
+              <p:ext uri="{D42A27DB-BD31-4B8C-83A1-F6EECF244321}">
+                <p14:modId xmlns:p14="http://schemas.microsoft.com/office/powerpoint/2010/main" val="328237423"/>
+              </p:ext>
+            </p:extLst>
+          </p:nvPr>
+        </p:nvGraphicFramePr>
+        <p:xfrm>
+          <a:off x="4180840" y="774530"/>
+          <a:ext cx="8128000" cy="5418667"/>
+        </p:xfrm>
+        <a:graphic>
+          <a:graphicData uri="http://schemas.openxmlformats.org/drawingml/2006/diagram">
+            <dgm:relIds xmlns:dgm="http://schemas.openxmlformats.org/drawingml/2006/diagram" xmlns:r="http://schemas.openxmlformats.org/officeDocument/2006/relationships" r:dm="rId2" r:lo="rId3" r:qs="rId4" r:cs="rId5"/>
+          </a:graphicData>
+        </a:graphic>
+      </p:graphicFrame>
+      <p:pic>
+        <p:nvPicPr>
+          <p:cNvPr id="4" name="Picture 3"/>
+          <p:cNvPicPr>
+            <a:picLocks noChangeAspect="1"/>
+          </p:cNvPicPr>
+          <p:nvPr/>
+        </p:nvPicPr>
+        <p:blipFill>
+          <a:blip r:embed="rId7"/>
+          <a:stretch>
+            <a:fillRect/>
+          </a:stretch>
+        </p:blipFill>
+        <p:spPr>
+          <a:xfrm>
+            <a:off x="905256" y="1817370"/>
+            <a:ext cx="2551176" cy="1551391"/>
+          </a:xfrm>
+          <a:prstGeom prst="rect">
+            <a:avLst/>
+          </a:prstGeom>
+        </p:spPr>
+      </p:pic>
+      <p:sp>
+        <p:nvSpPr>
+          <p:cNvPr id="5" name="Notched Right Arrow 4"/>
+          <p:cNvSpPr/>
+          <p:nvPr/>
+        </p:nvSpPr>
+        <p:spPr>
+          <a:xfrm>
+            <a:off x="3831336" y="2212848"/>
+            <a:ext cx="1325880" cy="566928"/>
+          </a:xfrm>
+          <a:prstGeom prst="notchedRightArrow">
+            <a:avLst/>
+          </a:prstGeom>
+        </p:spPr>
+        <p:style>
+          <a:lnRef idx="2">
+            <a:schemeClr val="accent1">
+              <a:shade val="50000"/>
+            </a:schemeClr>
+          </a:lnRef>
+          <a:fillRef idx="1">
+            <a:schemeClr val="accent1"/>
+          </a:fillRef>
+          <a:effectRef idx="0">
+            <a:schemeClr val="accent1"/>
+          </a:effectRef>
+          <a:fontRef idx="minor">
+            <a:schemeClr val="lt1"/>
+          </a:fontRef>
+        </p:style>
+        <p:txBody>
+          <a:bodyPr rtlCol="0" anchor="ctr"/>
+          <a:lstStyle/>
+          <a:p>
+            <a:pPr algn="ctr"/>
+            <a:endParaRPr lang="en-US"/>
+          </a:p>
+        </p:txBody>
+      </p:sp>
+      <p:pic>
+        <p:nvPicPr>
+          <p:cNvPr id="7" name="Picture 6"/>
+          <p:cNvPicPr>
+            <a:picLocks noChangeAspect="1"/>
+          </p:cNvPicPr>
+          <p:nvPr/>
+        </p:nvPicPr>
+        <p:blipFill>
+          <a:blip r:embed="rId8"/>
+          <a:stretch>
+            <a:fillRect/>
+          </a:stretch>
+        </p:blipFill>
+        <p:spPr>
+          <a:xfrm>
+            <a:off x="671576" y="4073144"/>
+            <a:ext cx="2784856" cy="2784856"/>
+          </a:xfrm>
+          <a:prstGeom prst="rect">
+            <a:avLst/>
+          </a:prstGeom>
+        </p:spPr>
+      </p:pic>
+      <p:sp>
+        <p:nvSpPr>
+          <p:cNvPr id="8" name="Striped Right Arrow 7"/>
+          <p:cNvSpPr/>
+          <p:nvPr/>
+        </p:nvSpPr>
+        <p:spPr>
+          <a:xfrm rot="16200000">
+            <a:off x="1711960" y="3632051"/>
+            <a:ext cx="704088" cy="407711"/>
+          </a:xfrm>
+          <a:prstGeom prst="stripedRightArrow">
+            <a:avLst/>
+          </a:prstGeom>
+          <a:solidFill>
+            <a:srgbClr val="C00000"/>
+          </a:solidFill>
+        </p:spPr>
+        <p:style>
+          <a:lnRef idx="2">
+            <a:schemeClr val="accent1">
+              <a:shade val="50000"/>
+            </a:schemeClr>
+          </a:lnRef>
+          <a:fillRef idx="1">
+            <a:schemeClr val="accent1"/>
+          </a:fillRef>
+          <a:effectRef idx="0">
+            <a:schemeClr val="accent1"/>
+          </a:effectRef>
+          <a:fontRef idx="minor">
+            <a:schemeClr val="lt1"/>
+          </a:fontRef>
+        </p:style>
+        <p:txBody>
+          <a:bodyPr rtlCol="0" anchor="ctr"/>
+          <a:lstStyle/>
+          <a:p>
+            <a:pPr algn="ctr"/>
+            <a:endParaRPr lang="en-US"/>
+          </a:p>
+        </p:txBody>
+      </p:sp>
+    </p:spTree>
+    <p:extLst>
+      <p:ext uri="{BB962C8B-B14F-4D97-AF65-F5344CB8AC3E}">
+        <p14:creationId xmlns:p14="http://schemas.microsoft.com/office/powerpoint/2010/main" val="960245771"/>
+      </p:ext>
+    </p:extLst>
+  </p:cSld>
+  <p:clrMapOvr>
+    <a:masterClrMapping/>
+  </p:clrMapOvr>
+  <p:timing>
+    <p:tnLst>
+      <p:par>
+        <p:cTn id="1" dur="indefinite" restart="never" nodeType="tmRoot">
+          <p:childTnLst>
+            <p:seq concurrent="1" nextAc="seek">
+              <p:cTn id="2" dur="indefinite" nodeType="mainSeq">
+                <p:childTnLst>
+                  <p:par>
+                    <p:cTn id="3" fill="hold">
+                      <p:stCondLst>
+                        <p:cond delay="indefinite"/>
+                      </p:stCondLst>
+                      <p:childTnLst>
+                        <p:par>
+                          <p:cTn id="4" fill="hold">
+                            <p:stCondLst>
+                              <p:cond delay="0"/>
+                            </p:stCondLst>
+                            <p:childTnLst>
+                              <p:par>
+                                <p:cTn id="5" presetID="1" presetClass="entr" presetSubtype="0" fill="hold" nodeType="clickEffect">
+                                  <p:stCondLst>
+                                    <p:cond delay="0"/>
+                                  </p:stCondLst>
+                                  <p:childTnLst>
+                                    <p:set>
+                                      <p:cBhvr>
+                                        <p:cTn id="6" dur="1" fill="hold">
+                                          <p:stCondLst>
+                                            <p:cond delay="0"/>
+                                          </p:stCondLst>
+                                        </p:cTn>
+                                        <p:tgtEl>
+                                          <p:spTgt spid="7"/>
+                                        </p:tgtEl>
+                                        <p:attrNameLst>
+                                          <p:attrName>style.visibility</p:attrName>
+                                        </p:attrNameLst>
+                                      </p:cBhvr>
+                                      <p:to>
+                                        <p:strVal val="visible"/>
+                                      </p:to>
+                                    </p:set>
+                                  </p:childTnLst>
+                                </p:cTn>
+                              </p:par>
+                            </p:childTnLst>
+                          </p:cTn>
+                        </p:par>
+                      </p:childTnLst>
+                    </p:cTn>
+                  </p:par>
+                  <p:par>
+                    <p:cTn id="7" fill="hold">
+                      <p:stCondLst>
+                        <p:cond delay="indefinite"/>
+                      </p:stCondLst>
+                      <p:childTnLst>
+                        <p:par>
+                          <p:cTn id="8" fill="hold">
+                            <p:stCondLst>
+                              <p:cond delay="0"/>
+                            </p:stCondLst>
+                            <p:childTnLst>
+                              <p:par>
+                                <p:cTn id="9" presetID="5" presetClass="entr" presetSubtype="10" fill="hold" grpId="0" nodeType="clickEffect">
+                                  <p:stCondLst>
+                                    <p:cond delay="0"/>
+                                  </p:stCondLst>
+                                  <p:childTnLst>
+                                    <p:set>
+                                      <p:cBhvr>
+                                        <p:cTn id="10" dur="1" fill="hold">
+                                          <p:stCondLst>
+                                            <p:cond delay="0"/>
+                                          </p:stCondLst>
+                                        </p:cTn>
+                                        <p:tgtEl>
+                                          <p:spTgt spid="8"/>
+                                        </p:tgtEl>
+                                        <p:attrNameLst>
+                                          <p:attrName>style.visibility</p:attrName>
+                                        </p:attrNameLst>
+                                      </p:cBhvr>
+                                      <p:to>
+                                        <p:strVal val="visible"/>
+                                      </p:to>
+                                    </p:set>
+                                    <p:animEffect transition="in" filter="checkerboard(across)">
+                                      <p:cBhvr>
+                                        <p:cTn id="11" dur="500"/>
+                                        <p:tgtEl>
+                                          <p:spTgt spid="8"/>
+                                        </p:tgtEl>
+                                      </p:cBhvr>
+                                    </p:animEffect>
+                                  </p:childTnLst>
+                                </p:cTn>
+                              </p:par>
+                            </p:childTnLst>
+                          </p:cTn>
+                        </p:par>
+                      </p:childTnLst>
+                    </p:cTn>
+                  </p:par>
+                  <p:par>
+                    <p:cTn id="12" fill="hold">
+                      <p:stCondLst>
+                        <p:cond delay="indefinite"/>
+                      </p:stCondLst>
+                      <p:childTnLst>
+                        <p:par>
+                          <p:cTn id="13" fill="hold">
+                            <p:stCondLst>
+                              <p:cond delay="0"/>
+                            </p:stCondLst>
+                            <p:childTnLst>
+                              <p:par>
+                                <p:cTn id="14" presetID="5" presetClass="entr" presetSubtype="10" fill="hold" nodeType="clickEffect">
+                                  <p:stCondLst>
+                                    <p:cond delay="0"/>
+                                  </p:stCondLst>
+                                  <p:childTnLst>
+                                    <p:set>
+                                      <p:cBhvr>
+                                        <p:cTn id="15" dur="1" fill="hold">
+                                          <p:stCondLst>
+                                            <p:cond delay="0"/>
+                                          </p:stCondLst>
+                                        </p:cTn>
+                                        <p:tgtEl>
+                                          <p:spTgt spid="4"/>
+                                        </p:tgtEl>
+                                        <p:attrNameLst>
+                                          <p:attrName>style.visibility</p:attrName>
+                                        </p:attrNameLst>
+                                      </p:cBhvr>
+                                      <p:to>
+                                        <p:strVal val="visible"/>
+                                      </p:to>
+                                    </p:set>
+                                    <p:animEffect transition="in" filter="checkerboard(across)">
+                                      <p:cBhvr>
+                                        <p:cTn id="16" dur="500"/>
+                                        <p:tgtEl>
+                                          <p:spTgt spid="4"/>
+                                        </p:tgtEl>
+                                      </p:cBhvr>
+                                    </p:animEffect>
+                                  </p:childTnLst>
+                                </p:cTn>
+                              </p:par>
+                            </p:childTnLst>
+                          </p:cTn>
+                        </p:par>
+                      </p:childTnLst>
+                    </p:cTn>
+                  </p:par>
+                  <p:par>
+                    <p:cTn id="17" fill="hold">
+                      <p:stCondLst>
+                        <p:cond delay="indefinite"/>
+                      </p:stCondLst>
+                      <p:childTnLst>
+                        <p:par>
+                          <p:cTn id="18" fill="hold">
+                            <p:stCondLst>
+                              <p:cond delay="0"/>
+                            </p:stCondLst>
+                            <p:childTnLst>
+                              <p:par>
+                                <p:cTn id="19" presetID="5" presetClass="entr" presetSubtype="10" fill="hold" grpId="0" nodeType="clickEffect">
+                                  <p:stCondLst>
+                                    <p:cond delay="0"/>
+                                  </p:stCondLst>
+                                  <p:childTnLst>
+                                    <p:set>
+                                      <p:cBhvr>
+                                        <p:cTn id="20" dur="1" fill="hold">
+                                          <p:stCondLst>
+                                            <p:cond delay="0"/>
+                                          </p:stCondLst>
+                                        </p:cTn>
+                                        <p:tgtEl>
+                                          <p:spTgt spid="5"/>
+                                        </p:tgtEl>
+                                        <p:attrNameLst>
+                                          <p:attrName>style.visibility</p:attrName>
+                                        </p:attrNameLst>
+                                      </p:cBhvr>
+                                      <p:to>
+                                        <p:strVal val="visible"/>
+                                      </p:to>
+                                    </p:set>
+                                    <p:animEffect transition="in" filter="checkerboard(across)">
+                                      <p:cBhvr>
+                                        <p:cTn id="21" dur="500"/>
+                                        <p:tgtEl>
+                                          <p:spTgt spid="5"/>
+                                        </p:tgtEl>
+                                      </p:cBhvr>
+                                    </p:animEffect>
+                                  </p:childTnLst>
+                                </p:cTn>
+                              </p:par>
+                            </p:childTnLst>
+                          </p:cTn>
+                        </p:par>
+                      </p:childTnLst>
+                    </p:cTn>
+                  </p:par>
+                  <p:par>
+                    <p:cTn id="22" fill="hold">
+                      <p:stCondLst>
+                        <p:cond delay="indefinite"/>
+                      </p:stCondLst>
+                      <p:childTnLst>
+                        <p:par>
+                          <p:cTn id="23" fill="hold">
+                            <p:stCondLst>
+                              <p:cond delay="0"/>
+                            </p:stCondLst>
+                            <p:childTnLst>
+                              <p:par>
+                                <p:cTn id="24" presetID="1" presetClass="entr" presetSubtype="0" fill="hold" grpId="0" nodeType="clickEffect">
+                                  <p:stCondLst>
+                                    <p:cond delay="0"/>
+                                  </p:stCondLst>
+                                  <p:childTnLst>
+                                    <p:set>
+                                      <p:cBhvr>
+                                        <p:cTn id="25" dur="1" fill="hold">
+                                          <p:stCondLst>
+                                            <p:cond delay="0"/>
+                                          </p:stCondLst>
+                                        </p:cTn>
+                                        <p:tgtEl>
+                                          <p:spTgt spid="3"/>
+                                        </p:tgtEl>
+                                        <p:attrNameLst>
+                                          <p:attrName>style.visibility</p:attrName>
+                                        </p:attrNameLst>
+                                      </p:cBhvr>
+                                      <p:to>
+                                        <p:strVal val="visible"/>
+                                      </p:to>
+                                    </p:set>
+                                  </p:childTnLst>
+                                </p:cTn>
+                              </p:par>
+                            </p:childTnLst>
+                          </p:cTn>
+                        </p:par>
+                      </p:childTnLst>
+                    </p:cTn>
+                  </p:par>
+                </p:childTnLst>
+              </p:cTn>
+              <p:prevCondLst>
+                <p:cond evt="onPrev" delay="0">
+                  <p:tgtEl>
+                    <p:sldTgt/>
+                  </p:tgtEl>
+                </p:cond>
+              </p:prevCondLst>
+              <p:nextCondLst>
+                <p:cond evt="onNext" delay="0">
+                  <p:tgtEl>
+                    <p:sldTgt/>
+                  </p:tgtEl>
+                </p:cond>
+              </p:nextCondLst>
+            </p:seq>
+          </p:childTnLst>
+        </p:cTn>
+      </p:par>
+    </p:tnLst>
+    <p:bldLst>
+      <p:bldGraphic spid="3" grpId="0">
+        <p:bldAsOne/>
+      </p:bldGraphic>
+      <p:bldP spid="5" grpId="0" animBg="1"/>
+      <p:bldP spid="8" grpId="0" animBg="1"/>
+    </p:bldLst>
+  </p:timing>
 </p:sld>
 </file>
 

</xml_diff>